<commit_message>
modello finale con eliminazione numeri e punteggiatura regex
</commit_message>
<xml_diff>
--- a/Presentation.pptx
+++ b/Presentation.pptx
@@ -5,7 +5,7 @@
     <p:sldMasterId id="2147483682" r:id="rId1"/>
   </p:sldMasterIdLst>
   <p:notesMasterIdLst>
-    <p:notesMasterId r:id="rId14"/>
+    <p:notesMasterId r:id="rId16"/>
   </p:notesMasterIdLst>
   <p:sldIdLst>
     <p:sldId id="330" r:id="rId2"/>
@@ -20,26 +20,28 @@
     <p:sldId id="341" r:id="rId11"/>
     <p:sldId id="345" r:id="rId12"/>
     <p:sldId id="346" r:id="rId13"/>
+    <p:sldId id="347" r:id="rId14"/>
+    <p:sldId id="348" r:id="rId15"/>
   </p:sldIdLst>
   <p:sldSz cx="9144000" cy="5143500" type="screen16x9"/>
   <p:notesSz cx="6858000" cy="9144000"/>
   <p:embeddedFontLst>
     <p:embeddedFont>
       <p:font typeface="Roboto" panose="02000000000000000000" pitchFamily="2" charset="0"/>
-      <p:regular r:id="rId15"/>
-      <p:bold r:id="rId16"/>
-      <p:italic r:id="rId17"/>
-      <p:boldItalic r:id="rId18"/>
+      <p:regular r:id="rId17"/>
+      <p:bold r:id="rId18"/>
+      <p:italic r:id="rId19"/>
+      <p:boldItalic r:id="rId20"/>
     </p:embeddedFont>
     <p:embeddedFont>
       <p:font typeface="Roboto Condensed Light" panose="020F0302020204030204" pitchFamily="34" charset="0"/>
-      <p:regular r:id="rId19"/>
-      <p:italic r:id="rId20"/>
+      <p:regular r:id="rId21"/>
+      <p:italic r:id="rId22"/>
     </p:embeddedFont>
     <p:embeddedFont>
       <p:font typeface="Tajawal" pitchFamily="2" charset="-78"/>
-      <p:regular r:id="rId21"/>
-      <p:bold r:id="rId22"/>
+      <p:regular r:id="rId23"/>
+      <p:bold r:id="rId24"/>
     </p:embeddedFont>
   </p:embeddedFontLst>
   <p:defaultTextStyle>
@@ -1153,6 +1155,224 @@
     <p:extLst>
       <p:ext uri="{BB962C8B-B14F-4D97-AF65-F5344CB8AC3E}">
         <p14:creationId xmlns:p14="http://schemas.microsoft.com/office/powerpoint/2010/main" val="3852090680"/>
+      </p:ext>
+    </p:extLst>
+  </p:cSld>
+  <p:clrMapOvr>
+    <a:masterClrMapping/>
+  </p:clrMapOvr>
+</p:notes>
+</file>
+
+<file path=ppt/notesSlides/notesSlide13.xml><?xml version="1.0" encoding="utf-8"?>
+<p:notes xmlns:a="http://schemas.openxmlformats.org/drawingml/2006/main" xmlns:r="http://schemas.openxmlformats.org/officeDocument/2006/relationships" xmlns:p="http://schemas.openxmlformats.org/presentationml/2006/main" showMasterSp="0" showMasterPhAnim="0">
+  <p:cSld>
+    <p:spTree>
+      <p:nvGrpSpPr>
+        <p:cNvPr id="1" name="Shape 1339"/>
+        <p:cNvGrpSpPr/>
+        <p:nvPr/>
+      </p:nvGrpSpPr>
+      <p:grpSpPr>
+        <a:xfrm>
+          <a:off x="0" y="0"/>
+          <a:ext cx="0" cy="0"/>
+          <a:chOff x="0" y="0"/>
+          <a:chExt cx="0" cy="0"/>
+        </a:xfrm>
+      </p:grpSpPr>
+      <p:sp>
+        <p:nvSpPr>
+          <p:cNvPr id="1340" name="Google Shape;1340;gf311197722_0_10:notes"/>
+          <p:cNvSpPr>
+            <a:spLocks noGrp="1" noRot="1" noChangeAspect="1"/>
+          </p:cNvSpPr>
+          <p:nvPr>
+            <p:ph type="sldImg" idx="2"/>
+          </p:nvPr>
+        </p:nvSpPr>
+        <p:spPr>
+          <a:xfrm>
+            <a:off x="381000" y="685800"/>
+            <a:ext cx="6096000" cy="3429000"/>
+          </a:xfrm>
+          <a:custGeom>
+            <a:avLst/>
+            <a:gdLst/>
+            <a:ahLst/>
+            <a:cxnLst/>
+            <a:rect l="l" t="t" r="r" b="b"/>
+            <a:pathLst>
+              <a:path w="120000" h="120000" extrusionOk="0">
+                <a:moveTo>
+                  <a:pt x="0" y="0"/>
+                </a:moveTo>
+                <a:lnTo>
+                  <a:pt x="120000" y="0"/>
+                </a:lnTo>
+                <a:lnTo>
+                  <a:pt x="120000" y="120000"/>
+                </a:lnTo>
+                <a:lnTo>
+                  <a:pt x="0" y="120000"/>
+                </a:lnTo>
+                <a:close/>
+              </a:path>
+            </a:pathLst>
+          </a:custGeom>
+        </p:spPr>
+      </p:sp>
+      <p:sp>
+        <p:nvSpPr>
+          <p:cNvPr id="1341" name="Google Shape;1341;gf311197722_0_10:notes"/>
+          <p:cNvSpPr txBox="1">
+            <a:spLocks noGrp="1"/>
+          </p:cNvSpPr>
+          <p:nvPr>
+            <p:ph type="body" idx="1"/>
+          </p:nvPr>
+        </p:nvSpPr>
+        <p:spPr>
+          <a:xfrm>
+            <a:off x="685800" y="4343400"/>
+            <a:ext cx="5486400" cy="4114800"/>
+          </a:xfrm>
+          <a:prstGeom prst="rect">
+            <a:avLst/>
+          </a:prstGeom>
+        </p:spPr>
+        <p:txBody>
+          <a:bodyPr spcFirstLastPara="1" wrap="square" lIns="91425" tIns="91425" rIns="91425" bIns="91425" anchor="t" anchorCtr="0">
+            <a:noAutofit/>
+          </a:bodyPr>
+          <a:lstStyle/>
+          <a:p>
+            <a:pPr marL="0" lvl="0" indent="0" algn="l" rtl="0">
+              <a:spcBef>
+                <a:spcPts val="0"/>
+              </a:spcBef>
+              <a:spcAft>
+                <a:spcPts val="0"/>
+              </a:spcAft>
+              <a:buNone/>
+            </a:pPr>
+            <a:endParaRPr dirty="0"/>
+          </a:p>
+        </p:txBody>
+      </p:sp>
+    </p:spTree>
+    <p:extLst>
+      <p:ext uri="{BB962C8B-B14F-4D97-AF65-F5344CB8AC3E}">
+        <p14:creationId xmlns:p14="http://schemas.microsoft.com/office/powerpoint/2010/main" val="3544096429"/>
+      </p:ext>
+    </p:extLst>
+  </p:cSld>
+  <p:clrMapOvr>
+    <a:masterClrMapping/>
+  </p:clrMapOvr>
+</p:notes>
+</file>
+
+<file path=ppt/notesSlides/notesSlide14.xml><?xml version="1.0" encoding="utf-8"?>
+<p:notes xmlns:a="http://schemas.openxmlformats.org/drawingml/2006/main" xmlns:r="http://schemas.openxmlformats.org/officeDocument/2006/relationships" xmlns:p="http://schemas.openxmlformats.org/presentationml/2006/main" showMasterSp="0" showMasterPhAnim="0">
+  <p:cSld>
+    <p:spTree>
+      <p:nvGrpSpPr>
+        <p:cNvPr id="1" name="Shape 1339"/>
+        <p:cNvGrpSpPr/>
+        <p:nvPr/>
+      </p:nvGrpSpPr>
+      <p:grpSpPr>
+        <a:xfrm>
+          <a:off x="0" y="0"/>
+          <a:ext cx="0" cy="0"/>
+          <a:chOff x="0" y="0"/>
+          <a:chExt cx="0" cy="0"/>
+        </a:xfrm>
+      </p:grpSpPr>
+      <p:sp>
+        <p:nvSpPr>
+          <p:cNvPr id="1340" name="Google Shape;1340;gf311197722_0_10:notes"/>
+          <p:cNvSpPr>
+            <a:spLocks noGrp="1" noRot="1" noChangeAspect="1"/>
+          </p:cNvSpPr>
+          <p:nvPr>
+            <p:ph type="sldImg" idx="2"/>
+          </p:nvPr>
+        </p:nvSpPr>
+        <p:spPr>
+          <a:xfrm>
+            <a:off x="381000" y="685800"/>
+            <a:ext cx="6096000" cy="3429000"/>
+          </a:xfrm>
+          <a:custGeom>
+            <a:avLst/>
+            <a:gdLst/>
+            <a:ahLst/>
+            <a:cxnLst/>
+            <a:rect l="l" t="t" r="r" b="b"/>
+            <a:pathLst>
+              <a:path w="120000" h="120000" extrusionOk="0">
+                <a:moveTo>
+                  <a:pt x="0" y="0"/>
+                </a:moveTo>
+                <a:lnTo>
+                  <a:pt x="120000" y="0"/>
+                </a:lnTo>
+                <a:lnTo>
+                  <a:pt x="120000" y="120000"/>
+                </a:lnTo>
+                <a:lnTo>
+                  <a:pt x="0" y="120000"/>
+                </a:lnTo>
+                <a:close/>
+              </a:path>
+            </a:pathLst>
+          </a:custGeom>
+        </p:spPr>
+      </p:sp>
+      <p:sp>
+        <p:nvSpPr>
+          <p:cNvPr id="1341" name="Google Shape;1341;gf311197722_0_10:notes"/>
+          <p:cNvSpPr txBox="1">
+            <a:spLocks noGrp="1"/>
+          </p:cNvSpPr>
+          <p:nvPr>
+            <p:ph type="body" idx="1"/>
+          </p:nvPr>
+        </p:nvSpPr>
+        <p:spPr>
+          <a:xfrm>
+            <a:off x="685800" y="4343400"/>
+            <a:ext cx="5486400" cy="4114800"/>
+          </a:xfrm>
+          <a:prstGeom prst="rect">
+            <a:avLst/>
+          </a:prstGeom>
+        </p:spPr>
+        <p:txBody>
+          <a:bodyPr spcFirstLastPara="1" wrap="square" lIns="91425" tIns="91425" rIns="91425" bIns="91425" anchor="t" anchorCtr="0">
+            <a:noAutofit/>
+          </a:bodyPr>
+          <a:lstStyle/>
+          <a:p>
+            <a:pPr marL="0" lvl="0" indent="0" algn="l" rtl="0">
+              <a:spcBef>
+                <a:spcPts val="0"/>
+              </a:spcBef>
+              <a:spcAft>
+                <a:spcPts val="0"/>
+              </a:spcAft>
+              <a:buNone/>
+            </a:pPr>
+            <a:endParaRPr dirty="0"/>
+          </a:p>
+        </p:txBody>
+      </p:sp>
+    </p:spTree>
+    <p:extLst>
+      <p:ext uri="{BB962C8B-B14F-4D97-AF65-F5344CB8AC3E}">
+        <p14:creationId xmlns:p14="http://schemas.microsoft.com/office/powerpoint/2010/main" val="3776984744"/>
       </p:ext>
     </p:extLst>
   </p:cSld>
@@ -8294,6 +8514,20 @@
 <file path=ppt/slides/slide11.xml><?xml version="1.0" encoding="utf-8"?>
 <p:sld xmlns:a="http://schemas.openxmlformats.org/drawingml/2006/main" xmlns:r="http://schemas.openxmlformats.org/officeDocument/2006/relationships" xmlns:p="http://schemas.openxmlformats.org/presentationml/2006/main">
   <p:cSld>
+    <p:bg>
+      <p:bgPr>
+        <a:blipFill dpi="0" rotWithShape="1">
+          <a:blip r:embed="rId3">
+            <a:lum/>
+          </a:blip>
+          <a:srcRect/>
+          <a:stretch>
+            <a:fillRect l="-10000" r="-10000"/>
+          </a:stretch>
+        </a:blipFill>
+        <a:effectLst/>
+      </p:bgPr>
+    </p:bg>
     <p:spTree>
       <p:nvGrpSpPr>
         <p:cNvPr id="1" name="Shape 1342"/>
@@ -9318,6 +9552,20 @@
             </a:pPr>
             <a:r>
               <a:rPr lang="en-GB" sz="1600" dirty="0"/>
+              <a:t>remove punctuation, numbers</a:t>
+            </a:r>
+          </a:p>
+          <a:p>
+            <a:pPr marL="285750" indent="-285750">
+              <a:buClr>
+                <a:schemeClr val="dk1"/>
+              </a:buClr>
+              <a:buSzPct val="100000"/>
+              <a:buFont typeface="Arial" panose="020B0604020202020204" pitchFamily="34" charset="0"/>
+              <a:buChar char="•"/>
+            </a:pPr>
+            <a:r>
+              <a:rPr lang="en-GB" sz="1600" dirty="0"/>
               <a:t>tokenization</a:t>
             </a:r>
           </a:p>
@@ -9652,7 +9900,7 @@
           <p:nvPr/>
         </p:nvPicPr>
         <p:blipFill>
-          <a:blip r:embed="rId3"/>
+          <a:blip r:embed="rId4"/>
           <a:stretch>
             <a:fillRect/>
           </a:stretch>
@@ -9683,6 +9931,20 @@
 <file path=ppt/slides/slide12.xml><?xml version="1.0" encoding="utf-8"?>
 <p:sld xmlns:a="http://schemas.openxmlformats.org/drawingml/2006/main" xmlns:r="http://schemas.openxmlformats.org/officeDocument/2006/relationships" xmlns:p="http://schemas.openxmlformats.org/presentationml/2006/main">
   <p:cSld>
+    <p:bg>
+      <p:bgPr>
+        <a:blipFill dpi="0" rotWithShape="1">
+          <a:blip r:embed="rId3">
+            <a:lum/>
+          </a:blip>
+          <a:srcRect/>
+          <a:stretch>
+            <a:fillRect l="-10000" r="-10000"/>
+          </a:stretch>
+        </a:blipFill>
+        <a:effectLst/>
+      </p:bgPr>
+    </p:bg>
     <p:spTree>
       <p:nvGrpSpPr>
         <p:cNvPr id="1" name="Shape 1342"/>
@@ -9714,7 +9976,7 @@
         <p:spPr>
           <a:xfrm>
             <a:off x="713100" y="1029100"/>
-            <a:ext cx="7839229" cy="3420351"/>
+            <a:ext cx="7839229" cy="3913346"/>
           </a:xfrm>
           <a:prstGeom prst="rect">
             <a:avLst/>
@@ -10502,8 +10764,15 @@
                   </a:schemeClr>
                 </a:solidFill>
               </a:rPr>
-              <a:t>“away team”</a:t>
+              <a:t>“away team”.</a:t>
             </a:r>
+            <a:endParaRPr lang="en-GB" sz="1600" dirty="0">
+              <a:solidFill>
+                <a:schemeClr val="tx1">
+                  <a:lumMod val="50000"/>
+                </a:schemeClr>
+              </a:solidFill>
+            </a:endParaRPr>
           </a:p>
         </p:txBody>
       </p:sp>
@@ -11429,7 +11698,7 @@
           <p:nvPr/>
         </p:nvPicPr>
         <p:blipFill>
-          <a:blip r:embed="rId3"/>
+          <a:blip r:embed="rId4"/>
           <a:stretch>
             <a:fillRect/>
           </a:stretch>
@@ -11743,6 +12012,3329 @@
     <p:extLst>
       <p:ext uri="{BB962C8B-B14F-4D97-AF65-F5344CB8AC3E}">
         <p14:creationId xmlns:p14="http://schemas.microsoft.com/office/powerpoint/2010/main" val="3801064399"/>
+      </p:ext>
+    </p:extLst>
+  </p:cSld>
+  <p:clrMapOvr>
+    <a:masterClrMapping/>
+  </p:clrMapOvr>
+</p:sld>
+</file>
+
+<file path=ppt/slides/slide13.xml><?xml version="1.0" encoding="utf-8"?>
+<p:sld xmlns:a="http://schemas.openxmlformats.org/drawingml/2006/main" xmlns:r="http://schemas.openxmlformats.org/officeDocument/2006/relationships" xmlns:p="http://schemas.openxmlformats.org/presentationml/2006/main">
+  <p:cSld>
+    <p:bg>
+      <p:bgPr>
+        <a:blipFill dpi="0" rotWithShape="1">
+          <a:blip r:embed="rId3">
+            <a:lum/>
+          </a:blip>
+          <a:srcRect/>
+          <a:stretch>
+            <a:fillRect l="-10000" r="-10000"/>
+          </a:stretch>
+        </a:blipFill>
+        <a:effectLst/>
+      </p:bgPr>
+    </p:bg>
+    <p:spTree>
+      <p:nvGrpSpPr>
+        <p:cNvPr id="1" name="Shape 1342"/>
+        <p:cNvGrpSpPr/>
+        <p:nvPr/>
+      </p:nvGrpSpPr>
+      <p:grpSpPr>
+        <a:xfrm>
+          <a:off x="0" y="0"/>
+          <a:ext cx="0" cy="0"/>
+          <a:chOff x="0" y="0"/>
+          <a:chExt cx="0" cy="0"/>
+        </a:xfrm>
+      </p:grpSpPr>
+      <p:sp>
+        <p:nvSpPr>
+          <p:cNvPr id="14" name="Google Shape;1344;p38">
+            <a:extLst>
+              <a:ext uri="{FF2B5EF4-FFF2-40B4-BE49-F238E27FC236}">
+                <a16:creationId xmlns:a16="http://schemas.microsoft.com/office/drawing/2014/main" id="{980922C1-A395-6BB4-730E-83A8E1094A76}"/>
+              </a:ext>
+            </a:extLst>
+          </p:cNvPr>
+          <p:cNvSpPr txBox="1">
+            <a:spLocks/>
+          </p:cNvSpPr>
+          <p:nvPr/>
+        </p:nvSpPr>
+        <p:spPr>
+          <a:xfrm>
+            <a:off x="713100" y="1029100"/>
+            <a:ext cx="7839229" cy="3913346"/>
+          </a:xfrm>
+          <a:prstGeom prst="rect">
+            <a:avLst/>
+          </a:prstGeom>
+          <a:noFill/>
+          <a:ln>
+            <a:noFill/>
+          </a:ln>
+        </p:spPr>
+        <p:txBody>
+          <a:bodyPr spcFirstLastPara="1" wrap="square" lIns="91425" tIns="91425" rIns="91425" bIns="91425" anchor="t" anchorCtr="0">
+            <a:noAutofit/>
+          </a:bodyPr>
+          <a:lstStyle>
+            <a:defPPr marR="0" lvl="0" algn="l" rtl="0">
+              <a:lnSpc>
+                <a:spcPct val="100000"/>
+              </a:lnSpc>
+              <a:spcBef>
+                <a:spcPts val="0"/>
+              </a:spcBef>
+              <a:spcAft>
+                <a:spcPts val="0"/>
+              </a:spcAft>
+            </a:defPPr>
+            <a:lvl1pPr marL="457200" marR="0" lvl="0" indent="-304800" algn="l" rtl="0">
+              <a:lnSpc>
+                <a:spcPct val="100000"/>
+              </a:lnSpc>
+              <a:spcBef>
+                <a:spcPts val="0"/>
+              </a:spcBef>
+              <a:spcAft>
+                <a:spcPts val="0"/>
+              </a:spcAft>
+              <a:buClr>
+                <a:schemeClr val="accent2"/>
+              </a:buClr>
+              <a:buSzPts val="1200"/>
+              <a:buFont typeface="Roboto"/>
+              <a:buAutoNum type="arabicPeriod"/>
+              <a:defRPr sz="1200" b="0" i="0" u="none" strike="noStrike" cap="none">
+                <a:solidFill>
+                  <a:schemeClr val="dk1"/>
+                </a:solidFill>
+                <a:latin typeface="Roboto"/>
+                <a:ea typeface="Roboto"/>
+                <a:cs typeface="Roboto"/>
+                <a:sym typeface="Roboto"/>
+              </a:defRPr>
+            </a:lvl1pPr>
+            <a:lvl2pPr marL="914400" marR="0" lvl="1" indent="-304800" algn="l" rtl="0">
+              <a:lnSpc>
+                <a:spcPct val="115000"/>
+              </a:lnSpc>
+              <a:spcBef>
+                <a:spcPts val="0"/>
+              </a:spcBef>
+              <a:spcAft>
+                <a:spcPts val="0"/>
+              </a:spcAft>
+              <a:buClr>
+                <a:srgbClr val="434343"/>
+              </a:buClr>
+              <a:buSzPts val="1200"/>
+              <a:buFont typeface="Roboto Condensed Light"/>
+              <a:buAutoNum type="alphaLcPeriod"/>
+              <a:defRPr sz="1400" b="0" i="0" u="none" strike="noStrike" cap="none">
+                <a:solidFill>
+                  <a:schemeClr val="dk1"/>
+                </a:solidFill>
+                <a:latin typeface="Roboto"/>
+                <a:ea typeface="Roboto"/>
+                <a:cs typeface="Roboto"/>
+                <a:sym typeface="Roboto"/>
+              </a:defRPr>
+            </a:lvl2pPr>
+            <a:lvl3pPr marL="1371600" marR="0" lvl="2" indent="-304800" algn="l" rtl="0">
+              <a:lnSpc>
+                <a:spcPct val="115000"/>
+              </a:lnSpc>
+              <a:spcBef>
+                <a:spcPts val="0"/>
+              </a:spcBef>
+              <a:spcAft>
+                <a:spcPts val="0"/>
+              </a:spcAft>
+              <a:buClr>
+                <a:srgbClr val="434343"/>
+              </a:buClr>
+              <a:buSzPts val="1200"/>
+              <a:buFont typeface="Roboto Condensed Light"/>
+              <a:buAutoNum type="romanLcPeriod"/>
+              <a:defRPr sz="1400" b="0" i="0" u="none" strike="noStrike" cap="none">
+                <a:solidFill>
+                  <a:schemeClr val="dk1"/>
+                </a:solidFill>
+                <a:latin typeface="Roboto"/>
+                <a:ea typeface="Roboto"/>
+                <a:cs typeface="Roboto"/>
+                <a:sym typeface="Roboto"/>
+              </a:defRPr>
+            </a:lvl3pPr>
+            <a:lvl4pPr marL="1828800" marR="0" lvl="3" indent="-304800" algn="l" rtl="0">
+              <a:lnSpc>
+                <a:spcPct val="115000"/>
+              </a:lnSpc>
+              <a:spcBef>
+                <a:spcPts val="0"/>
+              </a:spcBef>
+              <a:spcAft>
+                <a:spcPts val="0"/>
+              </a:spcAft>
+              <a:buClr>
+                <a:srgbClr val="434343"/>
+              </a:buClr>
+              <a:buSzPts val="1200"/>
+              <a:buFont typeface="Roboto Condensed Light"/>
+              <a:buAutoNum type="arabicPeriod"/>
+              <a:defRPr sz="1400" b="0" i="0" u="none" strike="noStrike" cap="none">
+                <a:solidFill>
+                  <a:schemeClr val="dk1"/>
+                </a:solidFill>
+                <a:latin typeface="Roboto"/>
+                <a:ea typeface="Roboto"/>
+                <a:cs typeface="Roboto"/>
+                <a:sym typeface="Roboto"/>
+              </a:defRPr>
+            </a:lvl4pPr>
+            <a:lvl5pPr marL="2286000" marR="0" lvl="4" indent="-304800" algn="l" rtl="0">
+              <a:lnSpc>
+                <a:spcPct val="115000"/>
+              </a:lnSpc>
+              <a:spcBef>
+                <a:spcPts val="0"/>
+              </a:spcBef>
+              <a:spcAft>
+                <a:spcPts val="0"/>
+              </a:spcAft>
+              <a:buClr>
+                <a:srgbClr val="434343"/>
+              </a:buClr>
+              <a:buSzPts val="1200"/>
+              <a:buFont typeface="Roboto Condensed Light"/>
+              <a:buAutoNum type="alphaLcPeriod"/>
+              <a:defRPr sz="1400" b="0" i="0" u="none" strike="noStrike" cap="none">
+                <a:solidFill>
+                  <a:schemeClr val="dk1"/>
+                </a:solidFill>
+                <a:latin typeface="Roboto"/>
+                <a:ea typeface="Roboto"/>
+                <a:cs typeface="Roboto"/>
+                <a:sym typeface="Roboto"/>
+              </a:defRPr>
+            </a:lvl5pPr>
+            <a:lvl6pPr marL="2743200" marR="0" lvl="5" indent="-304800" algn="l" rtl="0">
+              <a:lnSpc>
+                <a:spcPct val="115000"/>
+              </a:lnSpc>
+              <a:spcBef>
+                <a:spcPts val="0"/>
+              </a:spcBef>
+              <a:spcAft>
+                <a:spcPts val="0"/>
+              </a:spcAft>
+              <a:buClr>
+                <a:srgbClr val="434343"/>
+              </a:buClr>
+              <a:buSzPts val="1200"/>
+              <a:buFont typeface="Roboto Condensed Light"/>
+              <a:buAutoNum type="romanLcPeriod"/>
+              <a:defRPr sz="1400" b="0" i="0" u="none" strike="noStrike" cap="none">
+                <a:solidFill>
+                  <a:schemeClr val="dk1"/>
+                </a:solidFill>
+                <a:latin typeface="Roboto"/>
+                <a:ea typeface="Roboto"/>
+                <a:cs typeface="Roboto"/>
+                <a:sym typeface="Roboto"/>
+              </a:defRPr>
+            </a:lvl6pPr>
+            <a:lvl7pPr marL="3200400" marR="0" lvl="6" indent="-304800" algn="l" rtl="0">
+              <a:lnSpc>
+                <a:spcPct val="115000"/>
+              </a:lnSpc>
+              <a:spcBef>
+                <a:spcPts val="0"/>
+              </a:spcBef>
+              <a:spcAft>
+                <a:spcPts val="0"/>
+              </a:spcAft>
+              <a:buClr>
+                <a:srgbClr val="434343"/>
+              </a:buClr>
+              <a:buSzPts val="1200"/>
+              <a:buFont typeface="Roboto Condensed Light"/>
+              <a:buAutoNum type="arabicPeriod"/>
+              <a:defRPr sz="1400" b="0" i="0" u="none" strike="noStrike" cap="none">
+                <a:solidFill>
+                  <a:schemeClr val="dk1"/>
+                </a:solidFill>
+                <a:latin typeface="Roboto"/>
+                <a:ea typeface="Roboto"/>
+                <a:cs typeface="Roboto"/>
+                <a:sym typeface="Roboto"/>
+              </a:defRPr>
+            </a:lvl7pPr>
+            <a:lvl8pPr marL="3657600" marR="0" lvl="7" indent="-304800" algn="l" rtl="0">
+              <a:lnSpc>
+                <a:spcPct val="115000"/>
+              </a:lnSpc>
+              <a:spcBef>
+                <a:spcPts val="0"/>
+              </a:spcBef>
+              <a:spcAft>
+                <a:spcPts val="0"/>
+              </a:spcAft>
+              <a:buClr>
+                <a:srgbClr val="434343"/>
+              </a:buClr>
+              <a:buSzPts val="1200"/>
+              <a:buFont typeface="Roboto Condensed Light"/>
+              <a:buAutoNum type="alphaLcPeriod"/>
+              <a:defRPr sz="1400" b="0" i="0" u="none" strike="noStrike" cap="none">
+                <a:solidFill>
+                  <a:schemeClr val="dk1"/>
+                </a:solidFill>
+                <a:latin typeface="Roboto"/>
+                <a:ea typeface="Roboto"/>
+                <a:cs typeface="Roboto"/>
+                <a:sym typeface="Roboto"/>
+              </a:defRPr>
+            </a:lvl8pPr>
+            <a:lvl9pPr marL="4114800" marR="0" lvl="8" indent="-304800" algn="l" rtl="0">
+              <a:lnSpc>
+                <a:spcPct val="115000"/>
+              </a:lnSpc>
+              <a:spcBef>
+                <a:spcPts val="0"/>
+              </a:spcBef>
+              <a:spcAft>
+                <a:spcPts val="0"/>
+              </a:spcAft>
+              <a:buClr>
+                <a:srgbClr val="434343"/>
+              </a:buClr>
+              <a:buSzPts val="1200"/>
+              <a:buFont typeface="Roboto Condensed Light"/>
+              <a:buAutoNum type="romanLcPeriod"/>
+              <a:defRPr sz="1400" b="0" i="0" u="none" strike="noStrike" cap="none">
+                <a:solidFill>
+                  <a:schemeClr val="dk1"/>
+                </a:solidFill>
+                <a:latin typeface="Roboto"/>
+                <a:ea typeface="Roboto"/>
+                <a:cs typeface="Roboto"/>
+                <a:sym typeface="Roboto"/>
+              </a:defRPr>
+            </a:lvl9pPr>
+          </a:lstStyle>
+          <a:p>
+            <a:pPr marL="0" indent="0">
+              <a:buClr>
+                <a:schemeClr val="dk1"/>
+              </a:buClr>
+              <a:buSzPts val="1100"/>
+              <a:buNone/>
+            </a:pPr>
+            <a:r>
+              <a:rPr lang="en-GB" sz="1600" dirty="0"/>
+              <a:t>The below steps are followed for each document found in the dataset. </a:t>
+            </a:r>
+          </a:p>
+          <a:p>
+            <a:pPr marL="0" indent="0">
+              <a:buClr>
+                <a:schemeClr val="dk1"/>
+              </a:buClr>
+              <a:buSzPts val="1100"/>
+              <a:buNone/>
+            </a:pPr>
+            <a:endParaRPr lang="en-GB" sz="1600" dirty="0"/>
+          </a:p>
+          <a:p>
+            <a:pPr marL="0" indent="0">
+              <a:buClr>
+                <a:schemeClr val="dk1"/>
+              </a:buClr>
+              <a:buSzPts val="1100"/>
+              <a:buNone/>
+            </a:pPr>
+            <a:r>
+              <a:rPr lang="en-GB" sz="1600" dirty="0"/>
+              <a:t>Punctuations and numbers don’t help much in processing the given text, if included, they will just increase the size of a bag of words that we will create as the last step and decrease the efficiency of an algorithm.</a:t>
+            </a:r>
+          </a:p>
+          <a:p>
+            <a:pPr marL="0" indent="0">
+              <a:buClr>
+                <a:schemeClr val="dk1"/>
+              </a:buClr>
+              <a:buSzPts val="1100"/>
+              <a:buNone/>
+            </a:pPr>
+            <a:r>
+              <a:rPr lang="en-GB" sz="1600" dirty="0"/>
+              <a:t>So, punctuation and numbers are removed from the text using regular expressions. </a:t>
+            </a:r>
+          </a:p>
+          <a:p>
+            <a:pPr marL="0" indent="0">
+              <a:buClr>
+                <a:schemeClr val="dk1"/>
+              </a:buClr>
+              <a:buSzPts val="1100"/>
+              <a:buNone/>
+            </a:pPr>
+            <a:endParaRPr lang="en-GB" sz="1600" dirty="0"/>
+          </a:p>
+          <a:p>
+            <a:pPr marL="0" indent="0">
+              <a:buClr>
+                <a:schemeClr val="dk1"/>
+              </a:buClr>
+              <a:buSzPts val="1100"/>
+              <a:buNone/>
+            </a:pPr>
+            <a:r>
+              <a:rPr lang="en-GB" sz="1600" dirty="0"/>
+              <a:t>After that, the document is tokenized and stop words are removed from the list of tokens (stop words filtering).</a:t>
+            </a:r>
+          </a:p>
+          <a:p>
+            <a:pPr marL="0" indent="0">
+              <a:buClr>
+                <a:schemeClr val="dk1"/>
+              </a:buClr>
+              <a:buSzPts val="1100"/>
+              <a:buNone/>
+            </a:pPr>
+            <a:endParaRPr lang="en-GB" sz="1600" dirty="0"/>
+          </a:p>
+          <a:p>
+            <a:pPr marL="0" indent="0">
+              <a:buClr>
+                <a:schemeClr val="dk1"/>
+              </a:buClr>
+              <a:buSzPts val="1100"/>
+              <a:buNone/>
+            </a:pPr>
+            <a:r>
+              <a:rPr lang="en-GB" sz="1600" dirty="0"/>
+              <a:t>The last phase is the stemming, so for each token is taken its root word.</a:t>
+            </a:r>
+          </a:p>
+          <a:p>
+            <a:pPr marL="0" indent="0">
+              <a:buClr>
+                <a:schemeClr val="dk1"/>
+              </a:buClr>
+              <a:buSzPts val="1100"/>
+              <a:buNone/>
+            </a:pPr>
+            <a:endParaRPr lang="en-GB" sz="1600" dirty="0"/>
+          </a:p>
+        </p:txBody>
+      </p:sp>
+      <p:grpSp>
+        <p:nvGrpSpPr>
+          <p:cNvPr id="1362" name="Google Shape;1362;p38"/>
+          <p:cNvGrpSpPr/>
+          <p:nvPr/>
+        </p:nvGrpSpPr>
+        <p:grpSpPr>
+          <a:xfrm rot="1796183">
+            <a:off x="-280957" y="4547452"/>
+            <a:ext cx="957552" cy="766847"/>
+            <a:chOff x="4365025" y="1539800"/>
+            <a:chExt cx="121025" cy="96925"/>
+          </a:xfrm>
+        </p:grpSpPr>
+        <p:sp>
+          <p:nvSpPr>
+            <p:cNvPr id="1363" name="Google Shape;1363;p38"/>
+            <p:cNvSpPr/>
+            <p:nvPr/>
+          </p:nvSpPr>
+          <p:spPr>
+            <a:xfrm>
+              <a:off x="4365025" y="1587950"/>
+              <a:ext cx="30125" cy="19500"/>
+            </a:xfrm>
+            <a:custGeom>
+              <a:avLst/>
+              <a:gdLst/>
+              <a:ahLst/>
+              <a:cxnLst/>
+              <a:rect l="l" t="t" r="r" b="b"/>
+              <a:pathLst>
+                <a:path w="1205" h="780" extrusionOk="0">
+                  <a:moveTo>
+                    <a:pt x="786" y="0"/>
+                  </a:moveTo>
+                  <a:cubicBezTo>
+                    <a:pt x="525" y="3"/>
+                    <a:pt x="1" y="135"/>
+                    <a:pt x="70" y="487"/>
+                  </a:cubicBezTo>
+                  <a:cubicBezTo>
+                    <a:pt x="112" y="700"/>
+                    <a:pt x="344" y="779"/>
+                    <a:pt x="555" y="779"/>
+                  </a:cubicBezTo>
+                  <a:cubicBezTo>
+                    <a:pt x="632" y="779"/>
+                    <a:pt x="705" y="769"/>
+                    <a:pt x="766" y="751"/>
+                  </a:cubicBezTo>
+                  <a:cubicBezTo>
+                    <a:pt x="949" y="699"/>
+                    <a:pt x="1204" y="525"/>
+                    <a:pt x="1147" y="307"/>
+                  </a:cubicBezTo>
+                  <a:cubicBezTo>
+                    <a:pt x="1115" y="184"/>
+                    <a:pt x="929" y="49"/>
+                    <a:pt x="786" y="0"/>
+                  </a:cubicBezTo>
+                  <a:close/>
+                </a:path>
+              </a:pathLst>
+            </a:custGeom>
+            <a:solidFill>
+              <a:schemeClr val="accent4"/>
+            </a:solidFill>
+            <a:ln>
+              <a:noFill/>
+            </a:ln>
+          </p:spPr>
+          <p:txBody>
+            <a:bodyPr spcFirstLastPara="1" wrap="square" lIns="91425" tIns="91425" rIns="91425" bIns="91425" anchor="ctr" anchorCtr="0">
+              <a:noAutofit/>
+            </a:bodyPr>
+            <a:lstStyle/>
+            <a:p>
+              <a:pPr marL="0" lvl="0" indent="0" algn="l" rtl="0">
+                <a:spcBef>
+                  <a:spcPts val="0"/>
+                </a:spcBef>
+                <a:spcAft>
+                  <a:spcPts val="0"/>
+                </a:spcAft>
+                <a:buNone/>
+              </a:pPr>
+              <a:endParaRPr/>
+            </a:p>
+          </p:txBody>
+        </p:sp>
+        <p:sp>
+          <p:nvSpPr>
+            <p:cNvPr id="1364" name="Google Shape;1364;p38"/>
+            <p:cNvSpPr/>
+            <p:nvPr/>
+          </p:nvSpPr>
+          <p:spPr>
+            <a:xfrm>
+              <a:off x="4407850" y="1579225"/>
+              <a:ext cx="22750" cy="14925"/>
+            </a:xfrm>
+            <a:custGeom>
+              <a:avLst/>
+              <a:gdLst/>
+              <a:ahLst/>
+              <a:cxnLst/>
+              <a:rect l="l" t="t" r="r" b="b"/>
+              <a:pathLst>
+                <a:path w="910" h="597" extrusionOk="0">
+                  <a:moveTo>
+                    <a:pt x="581" y="0"/>
+                  </a:moveTo>
+                  <a:cubicBezTo>
+                    <a:pt x="571" y="0"/>
+                    <a:pt x="561" y="1"/>
+                    <a:pt x="551" y="3"/>
+                  </a:cubicBezTo>
+                  <a:lnTo>
+                    <a:pt x="594" y="8"/>
+                  </a:lnTo>
+                  <a:cubicBezTo>
+                    <a:pt x="1" y="8"/>
+                    <a:pt x="140" y="596"/>
+                    <a:pt x="475" y="596"/>
+                  </a:cubicBezTo>
+                  <a:cubicBezTo>
+                    <a:pt x="531" y="596"/>
+                    <a:pt x="593" y="580"/>
+                    <a:pt x="657" y="541"/>
+                  </a:cubicBezTo>
+                  <a:cubicBezTo>
+                    <a:pt x="801" y="455"/>
+                    <a:pt x="909" y="343"/>
+                    <a:pt x="832" y="180"/>
+                  </a:cubicBezTo>
+                  <a:cubicBezTo>
+                    <a:pt x="788" y="81"/>
+                    <a:pt x="686" y="0"/>
+                    <a:pt x="581" y="0"/>
+                  </a:cubicBezTo>
+                  <a:close/>
+                </a:path>
+              </a:pathLst>
+            </a:custGeom>
+            <a:solidFill>
+              <a:schemeClr val="accent4"/>
+            </a:solidFill>
+            <a:ln>
+              <a:noFill/>
+            </a:ln>
+          </p:spPr>
+          <p:txBody>
+            <a:bodyPr spcFirstLastPara="1" wrap="square" lIns="91425" tIns="91425" rIns="91425" bIns="91425" anchor="ctr" anchorCtr="0">
+              <a:noAutofit/>
+            </a:bodyPr>
+            <a:lstStyle/>
+            <a:p>
+              <a:pPr marL="0" lvl="0" indent="0" algn="l" rtl="0">
+                <a:spcBef>
+                  <a:spcPts val="0"/>
+                </a:spcBef>
+                <a:spcAft>
+                  <a:spcPts val="0"/>
+                </a:spcAft>
+                <a:buNone/>
+              </a:pPr>
+              <a:endParaRPr/>
+            </a:p>
+          </p:txBody>
+        </p:sp>
+        <p:sp>
+          <p:nvSpPr>
+            <p:cNvPr id="1365" name="Google Shape;1365;p38"/>
+            <p:cNvSpPr/>
+            <p:nvPr/>
+          </p:nvSpPr>
+          <p:spPr>
+            <a:xfrm>
+              <a:off x="4403900" y="1617025"/>
+              <a:ext cx="28200" cy="19700"/>
+            </a:xfrm>
+            <a:custGeom>
+              <a:avLst/>
+              <a:gdLst/>
+              <a:ahLst/>
+              <a:cxnLst/>
+              <a:rect l="l" t="t" r="r" b="b"/>
+              <a:pathLst>
+                <a:path w="1128" h="788" extrusionOk="0">
+                  <a:moveTo>
+                    <a:pt x="649" y="0"/>
+                  </a:moveTo>
+                  <a:cubicBezTo>
+                    <a:pt x="0" y="101"/>
+                    <a:pt x="230" y="788"/>
+                    <a:pt x="599" y="788"/>
+                  </a:cubicBezTo>
+                  <a:cubicBezTo>
+                    <a:pt x="681" y="788"/>
+                    <a:pt x="770" y="754"/>
+                    <a:pt x="858" y="671"/>
+                  </a:cubicBezTo>
+                  <a:cubicBezTo>
+                    <a:pt x="1128" y="416"/>
+                    <a:pt x="921" y="141"/>
+                    <a:pt x="649" y="0"/>
+                  </a:cubicBezTo>
+                  <a:close/>
+                </a:path>
+              </a:pathLst>
+            </a:custGeom>
+            <a:solidFill>
+              <a:schemeClr val="accent4"/>
+            </a:solidFill>
+            <a:ln>
+              <a:noFill/>
+            </a:ln>
+          </p:spPr>
+          <p:txBody>
+            <a:bodyPr spcFirstLastPara="1" wrap="square" lIns="91425" tIns="91425" rIns="91425" bIns="91425" anchor="ctr" anchorCtr="0">
+              <a:noAutofit/>
+            </a:bodyPr>
+            <a:lstStyle/>
+            <a:p>
+              <a:pPr marL="0" lvl="0" indent="0" algn="l" rtl="0">
+                <a:spcBef>
+                  <a:spcPts val="0"/>
+                </a:spcBef>
+                <a:spcAft>
+                  <a:spcPts val="0"/>
+                </a:spcAft>
+                <a:buNone/>
+              </a:pPr>
+              <a:endParaRPr/>
+            </a:p>
+          </p:txBody>
+        </p:sp>
+        <p:sp>
+          <p:nvSpPr>
+            <p:cNvPr id="1366" name="Google Shape;1366;p38"/>
+            <p:cNvSpPr/>
+            <p:nvPr/>
+          </p:nvSpPr>
+          <p:spPr>
+            <a:xfrm>
+              <a:off x="4449625" y="1610200"/>
+              <a:ext cx="13700" cy="15800"/>
+            </a:xfrm>
+            <a:custGeom>
+              <a:avLst/>
+              <a:gdLst/>
+              <a:ahLst/>
+              <a:cxnLst/>
+              <a:rect l="l" t="t" r="r" b="b"/>
+              <a:pathLst>
+                <a:path w="548" h="632" extrusionOk="0">
+                  <a:moveTo>
+                    <a:pt x="299" y="0"/>
+                  </a:moveTo>
+                  <a:cubicBezTo>
+                    <a:pt x="274" y="0"/>
+                    <a:pt x="251" y="8"/>
+                    <a:pt x="230" y="27"/>
+                  </a:cubicBezTo>
+                  <a:lnTo>
+                    <a:pt x="207" y="59"/>
+                  </a:lnTo>
+                  <a:cubicBezTo>
+                    <a:pt x="78" y="248"/>
+                    <a:pt x="1" y="468"/>
+                    <a:pt x="213" y="632"/>
+                  </a:cubicBezTo>
+                  <a:cubicBezTo>
+                    <a:pt x="359" y="563"/>
+                    <a:pt x="548" y="408"/>
+                    <a:pt x="519" y="225"/>
+                  </a:cubicBezTo>
+                  <a:cubicBezTo>
+                    <a:pt x="505" y="131"/>
+                    <a:pt x="396" y="0"/>
+                    <a:pt x="299" y="0"/>
+                  </a:cubicBezTo>
+                  <a:close/>
+                </a:path>
+              </a:pathLst>
+            </a:custGeom>
+            <a:solidFill>
+              <a:schemeClr val="accent4"/>
+            </a:solidFill>
+            <a:ln>
+              <a:noFill/>
+            </a:ln>
+          </p:spPr>
+          <p:txBody>
+            <a:bodyPr spcFirstLastPara="1" wrap="square" lIns="91425" tIns="91425" rIns="91425" bIns="91425" anchor="ctr" anchorCtr="0">
+              <a:noAutofit/>
+            </a:bodyPr>
+            <a:lstStyle/>
+            <a:p>
+              <a:pPr marL="0" lvl="0" indent="0" algn="l" rtl="0">
+                <a:spcBef>
+                  <a:spcPts val="0"/>
+                </a:spcBef>
+                <a:spcAft>
+                  <a:spcPts val="0"/>
+                </a:spcAft>
+                <a:buNone/>
+              </a:pPr>
+              <a:endParaRPr/>
+            </a:p>
+          </p:txBody>
+        </p:sp>
+        <p:sp>
+          <p:nvSpPr>
+            <p:cNvPr id="1367" name="Google Shape;1367;p38"/>
+            <p:cNvSpPr/>
+            <p:nvPr/>
+          </p:nvSpPr>
+          <p:spPr>
+            <a:xfrm>
+              <a:off x="4388575" y="1553100"/>
+              <a:ext cx="24300" cy="10400"/>
+            </a:xfrm>
+            <a:custGeom>
+              <a:avLst/>
+              <a:gdLst/>
+              <a:ahLst/>
+              <a:cxnLst/>
+              <a:rect l="l" t="t" r="r" b="b"/>
+              <a:pathLst>
+                <a:path w="972" h="416" extrusionOk="0">
+                  <a:moveTo>
+                    <a:pt x="577" y="1"/>
+                  </a:moveTo>
+                  <a:cubicBezTo>
+                    <a:pt x="297" y="1"/>
+                    <a:pt x="1" y="289"/>
+                    <a:pt x="403" y="400"/>
+                  </a:cubicBezTo>
+                  <a:cubicBezTo>
+                    <a:pt x="440" y="410"/>
+                    <a:pt x="477" y="415"/>
+                    <a:pt x="514" y="415"/>
+                  </a:cubicBezTo>
+                  <a:cubicBezTo>
+                    <a:pt x="764" y="415"/>
+                    <a:pt x="972" y="196"/>
+                    <a:pt x="692" y="19"/>
+                  </a:cubicBezTo>
+                  <a:cubicBezTo>
+                    <a:pt x="655" y="6"/>
+                    <a:pt x="616" y="1"/>
+                    <a:pt x="577" y="1"/>
+                  </a:cubicBezTo>
+                  <a:close/>
+                </a:path>
+              </a:pathLst>
+            </a:custGeom>
+            <a:solidFill>
+              <a:schemeClr val="accent4"/>
+            </a:solidFill>
+            <a:ln>
+              <a:noFill/>
+            </a:ln>
+          </p:spPr>
+          <p:txBody>
+            <a:bodyPr spcFirstLastPara="1" wrap="square" lIns="91425" tIns="91425" rIns="91425" bIns="91425" anchor="ctr" anchorCtr="0">
+              <a:noAutofit/>
+            </a:bodyPr>
+            <a:lstStyle/>
+            <a:p>
+              <a:pPr marL="0" lvl="0" indent="0" algn="l" rtl="0">
+                <a:spcBef>
+                  <a:spcPts val="0"/>
+                </a:spcBef>
+                <a:spcAft>
+                  <a:spcPts val="0"/>
+                </a:spcAft>
+                <a:buNone/>
+              </a:pPr>
+              <a:endParaRPr/>
+            </a:p>
+          </p:txBody>
+        </p:sp>
+        <p:sp>
+          <p:nvSpPr>
+            <p:cNvPr id="1368" name="Google Shape;1368;p38"/>
+            <p:cNvSpPr/>
+            <p:nvPr/>
+          </p:nvSpPr>
+          <p:spPr>
+            <a:xfrm>
+              <a:off x="4457500" y="1582775"/>
+              <a:ext cx="13600" cy="7825"/>
+            </a:xfrm>
+            <a:custGeom>
+              <a:avLst/>
+              <a:gdLst/>
+              <a:ahLst/>
+              <a:cxnLst/>
+              <a:rect l="l" t="t" r="r" b="b"/>
+              <a:pathLst>
+                <a:path w="544" h="313" extrusionOk="0">
+                  <a:moveTo>
+                    <a:pt x="362" y="1"/>
+                  </a:moveTo>
+                  <a:cubicBezTo>
+                    <a:pt x="264" y="27"/>
+                    <a:pt x="1" y="67"/>
+                    <a:pt x="35" y="216"/>
+                  </a:cubicBezTo>
+                  <a:cubicBezTo>
+                    <a:pt x="51" y="296"/>
+                    <a:pt x="119" y="313"/>
+                    <a:pt x="186" y="313"/>
+                  </a:cubicBezTo>
+                  <a:cubicBezTo>
+                    <a:pt x="212" y="313"/>
+                    <a:pt x="239" y="310"/>
+                    <a:pt x="261" y="307"/>
+                  </a:cubicBezTo>
+                  <a:cubicBezTo>
+                    <a:pt x="345" y="299"/>
+                    <a:pt x="516" y="262"/>
+                    <a:pt x="534" y="153"/>
+                  </a:cubicBezTo>
+                  <a:cubicBezTo>
+                    <a:pt x="543" y="91"/>
+                    <a:pt x="467" y="11"/>
+                    <a:pt x="400" y="11"/>
+                  </a:cubicBezTo>
+                  <a:cubicBezTo>
+                    <a:pt x="389" y="11"/>
+                    <a:pt x="378" y="13"/>
+                    <a:pt x="367" y="18"/>
+                  </a:cubicBezTo>
+                  <a:lnTo>
+                    <a:pt x="362" y="1"/>
+                  </a:lnTo>
+                  <a:close/>
+                </a:path>
+              </a:pathLst>
+            </a:custGeom>
+            <a:solidFill>
+              <a:schemeClr val="accent4"/>
+            </a:solidFill>
+            <a:ln>
+              <a:noFill/>
+            </a:ln>
+          </p:spPr>
+          <p:txBody>
+            <a:bodyPr spcFirstLastPara="1" wrap="square" lIns="91425" tIns="91425" rIns="91425" bIns="91425" anchor="ctr" anchorCtr="0">
+              <a:noAutofit/>
+            </a:bodyPr>
+            <a:lstStyle/>
+            <a:p>
+              <a:pPr marL="0" lvl="0" indent="0" algn="l" rtl="0">
+                <a:spcBef>
+                  <a:spcPts val="0"/>
+                </a:spcBef>
+                <a:spcAft>
+                  <a:spcPts val="0"/>
+                </a:spcAft>
+                <a:buNone/>
+              </a:pPr>
+              <a:endParaRPr/>
+            </a:p>
+          </p:txBody>
+        </p:sp>
+        <p:sp>
+          <p:nvSpPr>
+            <p:cNvPr id="1369" name="Google Shape;1369;p38"/>
+            <p:cNvSpPr/>
+            <p:nvPr/>
+          </p:nvSpPr>
+          <p:spPr>
+            <a:xfrm>
+              <a:off x="4436600" y="1539800"/>
+              <a:ext cx="15925" cy="12850"/>
+            </a:xfrm>
+            <a:custGeom>
+              <a:avLst/>
+              <a:gdLst/>
+              <a:ahLst/>
+              <a:cxnLst/>
+              <a:rect l="l" t="t" r="r" b="b"/>
+              <a:pathLst>
+                <a:path w="637" h="514" extrusionOk="0">
+                  <a:moveTo>
+                    <a:pt x="473" y="1"/>
+                  </a:moveTo>
+                  <a:lnTo>
+                    <a:pt x="473" y="1"/>
+                  </a:lnTo>
+                  <a:cubicBezTo>
+                    <a:pt x="307" y="21"/>
+                    <a:pt x="0" y="196"/>
+                    <a:pt x="83" y="405"/>
+                  </a:cubicBezTo>
+                  <a:cubicBezTo>
+                    <a:pt x="115" y="484"/>
+                    <a:pt x="170" y="514"/>
+                    <a:pt x="230" y="514"/>
+                  </a:cubicBezTo>
+                  <a:cubicBezTo>
+                    <a:pt x="297" y="514"/>
+                    <a:pt x="370" y="478"/>
+                    <a:pt x="427" y="433"/>
+                  </a:cubicBezTo>
+                  <a:cubicBezTo>
+                    <a:pt x="570" y="319"/>
+                    <a:pt x="636" y="113"/>
+                    <a:pt x="473" y="1"/>
+                  </a:cubicBezTo>
+                  <a:close/>
+                </a:path>
+              </a:pathLst>
+            </a:custGeom>
+            <a:solidFill>
+              <a:schemeClr val="accent4"/>
+            </a:solidFill>
+            <a:ln>
+              <a:noFill/>
+            </a:ln>
+          </p:spPr>
+          <p:txBody>
+            <a:bodyPr spcFirstLastPara="1" wrap="square" lIns="91425" tIns="91425" rIns="91425" bIns="91425" anchor="ctr" anchorCtr="0">
+              <a:noAutofit/>
+            </a:bodyPr>
+            <a:lstStyle/>
+            <a:p>
+              <a:pPr marL="0" lvl="0" indent="0" algn="l" rtl="0">
+                <a:spcBef>
+                  <a:spcPts val="0"/>
+                </a:spcBef>
+                <a:spcAft>
+                  <a:spcPts val="0"/>
+                </a:spcAft>
+                <a:buNone/>
+              </a:pPr>
+              <a:endParaRPr/>
+            </a:p>
+          </p:txBody>
+        </p:sp>
+        <p:sp>
+          <p:nvSpPr>
+            <p:cNvPr id="1370" name="Google Shape;1370;p38"/>
+            <p:cNvSpPr/>
+            <p:nvPr/>
+          </p:nvSpPr>
+          <p:spPr>
+            <a:xfrm>
+              <a:off x="4472250" y="1549775"/>
+              <a:ext cx="13800" cy="12175"/>
+            </a:xfrm>
+            <a:custGeom>
+              <a:avLst/>
+              <a:gdLst/>
+              <a:ahLst/>
+              <a:cxnLst/>
+              <a:rect l="l" t="t" r="r" b="b"/>
+              <a:pathLst>
+                <a:path w="552" h="487" extrusionOk="0">
+                  <a:moveTo>
+                    <a:pt x="359" y="0"/>
+                  </a:moveTo>
+                  <a:lnTo>
+                    <a:pt x="359" y="0"/>
+                  </a:lnTo>
+                  <a:cubicBezTo>
+                    <a:pt x="239" y="37"/>
+                    <a:pt x="1" y="161"/>
+                    <a:pt x="18" y="315"/>
+                  </a:cubicBezTo>
+                  <a:cubicBezTo>
+                    <a:pt x="28" y="414"/>
+                    <a:pt x="123" y="487"/>
+                    <a:pt x="221" y="487"/>
+                  </a:cubicBezTo>
+                  <a:cubicBezTo>
+                    <a:pt x="239" y="487"/>
+                    <a:pt x="258" y="484"/>
+                    <a:pt x="276" y="479"/>
+                  </a:cubicBezTo>
+                  <a:cubicBezTo>
+                    <a:pt x="442" y="433"/>
+                    <a:pt x="551" y="118"/>
+                    <a:pt x="359" y="0"/>
+                  </a:cubicBezTo>
+                  <a:close/>
+                </a:path>
+              </a:pathLst>
+            </a:custGeom>
+            <a:solidFill>
+              <a:schemeClr val="accent4"/>
+            </a:solidFill>
+            <a:ln>
+              <a:noFill/>
+            </a:ln>
+          </p:spPr>
+          <p:txBody>
+            <a:bodyPr spcFirstLastPara="1" wrap="square" lIns="91425" tIns="91425" rIns="91425" bIns="91425" anchor="ctr" anchorCtr="0">
+              <a:noAutofit/>
+            </a:bodyPr>
+            <a:lstStyle/>
+            <a:p>
+              <a:pPr marL="0" lvl="0" indent="0" algn="l" rtl="0">
+                <a:spcBef>
+                  <a:spcPts val="0"/>
+                </a:spcBef>
+                <a:spcAft>
+                  <a:spcPts val="0"/>
+                </a:spcAft>
+                <a:buNone/>
+              </a:pPr>
+              <a:endParaRPr/>
+            </a:p>
+          </p:txBody>
+        </p:sp>
+      </p:grpSp>
+      <p:sp>
+        <p:nvSpPr>
+          <p:cNvPr id="7" name="Google Shape;1343;p38">
+            <a:extLst>
+              <a:ext uri="{FF2B5EF4-FFF2-40B4-BE49-F238E27FC236}">
+                <a16:creationId xmlns:a16="http://schemas.microsoft.com/office/drawing/2014/main" id="{F15CCC14-A652-DCAE-F707-EFA7C83CA764}"/>
+              </a:ext>
+            </a:extLst>
+          </p:cNvPr>
+          <p:cNvSpPr txBox="1">
+            <a:spLocks/>
+          </p:cNvSpPr>
+          <p:nvPr/>
+        </p:nvSpPr>
+        <p:spPr>
+          <a:xfrm>
+            <a:off x="685392" y="544550"/>
+            <a:ext cx="7717800" cy="572700"/>
+          </a:xfrm>
+          <a:prstGeom prst="rect">
+            <a:avLst/>
+          </a:prstGeom>
+          <a:noFill/>
+          <a:ln>
+            <a:noFill/>
+          </a:ln>
+        </p:spPr>
+        <p:txBody>
+          <a:bodyPr spcFirstLastPara="1" wrap="square" lIns="91425" tIns="91425" rIns="91425" bIns="91425" anchor="ctr" anchorCtr="0">
+            <a:noAutofit/>
+          </a:bodyPr>
+          <a:lstStyle>
+            <a:defPPr marR="0" lvl="0" algn="l" rtl="0">
+              <a:lnSpc>
+                <a:spcPct val="100000"/>
+              </a:lnSpc>
+              <a:spcBef>
+                <a:spcPts val="0"/>
+              </a:spcBef>
+              <a:spcAft>
+                <a:spcPts val="0"/>
+              </a:spcAft>
+            </a:defPPr>
+            <a:lvl1pPr marR="0" lvl="0" algn="l" rtl="0">
+              <a:lnSpc>
+                <a:spcPct val="100000"/>
+              </a:lnSpc>
+              <a:spcBef>
+                <a:spcPts val="0"/>
+              </a:spcBef>
+              <a:spcAft>
+                <a:spcPts val="0"/>
+              </a:spcAft>
+              <a:buClr>
+                <a:schemeClr val="dk1"/>
+              </a:buClr>
+              <a:buSzPts val="3200"/>
+              <a:buFont typeface="Tajawal"/>
+              <a:buNone/>
+              <a:defRPr sz="3200" b="1" i="0" u="none" strike="noStrike" cap="none">
+                <a:solidFill>
+                  <a:schemeClr val="dk1"/>
+                </a:solidFill>
+                <a:latin typeface="Tajawal"/>
+                <a:ea typeface="Tajawal"/>
+                <a:cs typeface="Tajawal"/>
+                <a:sym typeface="Tajawal"/>
+              </a:defRPr>
+            </a:lvl1pPr>
+            <a:lvl2pPr marR="0" lvl="1" algn="l" rtl="0">
+              <a:lnSpc>
+                <a:spcPct val="100000"/>
+              </a:lnSpc>
+              <a:spcBef>
+                <a:spcPts val="0"/>
+              </a:spcBef>
+              <a:spcAft>
+                <a:spcPts val="0"/>
+              </a:spcAft>
+              <a:buClr>
+                <a:schemeClr val="dk1"/>
+              </a:buClr>
+              <a:buSzPts val="3200"/>
+              <a:buFont typeface="Tajawal"/>
+              <a:buNone/>
+              <a:defRPr sz="3200" b="1" i="0" u="none" strike="noStrike" cap="none">
+                <a:solidFill>
+                  <a:schemeClr val="dk1"/>
+                </a:solidFill>
+                <a:latin typeface="Tajawal"/>
+                <a:ea typeface="Tajawal"/>
+                <a:cs typeface="Tajawal"/>
+                <a:sym typeface="Tajawal"/>
+              </a:defRPr>
+            </a:lvl2pPr>
+            <a:lvl3pPr marR="0" lvl="2" algn="l" rtl="0">
+              <a:lnSpc>
+                <a:spcPct val="100000"/>
+              </a:lnSpc>
+              <a:spcBef>
+                <a:spcPts val="0"/>
+              </a:spcBef>
+              <a:spcAft>
+                <a:spcPts val="0"/>
+              </a:spcAft>
+              <a:buClr>
+                <a:schemeClr val="dk1"/>
+              </a:buClr>
+              <a:buSzPts val="3200"/>
+              <a:buFont typeface="Tajawal"/>
+              <a:buNone/>
+              <a:defRPr sz="3200" b="1" i="0" u="none" strike="noStrike" cap="none">
+                <a:solidFill>
+                  <a:schemeClr val="dk1"/>
+                </a:solidFill>
+                <a:latin typeface="Tajawal"/>
+                <a:ea typeface="Tajawal"/>
+                <a:cs typeface="Tajawal"/>
+                <a:sym typeface="Tajawal"/>
+              </a:defRPr>
+            </a:lvl3pPr>
+            <a:lvl4pPr marR="0" lvl="3" algn="l" rtl="0">
+              <a:lnSpc>
+                <a:spcPct val="100000"/>
+              </a:lnSpc>
+              <a:spcBef>
+                <a:spcPts val="0"/>
+              </a:spcBef>
+              <a:spcAft>
+                <a:spcPts val="0"/>
+              </a:spcAft>
+              <a:buClr>
+                <a:schemeClr val="dk1"/>
+              </a:buClr>
+              <a:buSzPts val="3200"/>
+              <a:buFont typeface="Tajawal"/>
+              <a:buNone/>
+              <a:defRPr sz="3200" b="1" i="0" u="none" strike="noStrike" cap="none">
+                <a:solidFill>
+                  <a:schemeClr val="dk1"/>
+                </a:solidFill>
+                <a:latin typeface="Tajawal"/>
+                <a:ea typeface="Tajawal"/>
+                <a:cs typeface="Tajawal"/>
+                <a:sym typeface="Tajawal"/>
+              </a:defRPr>
+            </a:lvl4pPr>
+            <a:lvl5pPr marR="0" lvl="4" algn="l" rtl="0">
+              <a:lnSpc>
+                <a:spcPct val="100000"/>
+              </a:lnSpc>
+              <a:spcBef>
+                <a:spcPts val="0"/>
+              </a:spcBef>
+              <a:spcAft>
+                <a:spcPts val="0"/>
+              </a:spcAft>
+              <a:buClr>
+                <a:schemeClr val="dk1"/>
+              </a:buClr>
+              <a:buSzPts val="3200"/>
+              <a:buFont typeface="Tajawal"/>
+              <a:buNone/>
+              <a:defRPr sz="3200" b="1" i="0" u="none" strike="noStrike" cap="none">
+                <a:solidFill>
+                  <a:schemeClr val="dk1"/>
+                </a:solidFill>
+                <a:latin typeface="Tajawal"/>
+                <a:ea typeface="Tajawal"/>
+                <a:cs typeface="Tajawal"/>
+                <a:sym typeface="Tajawal"/>
+              </a:defRPr>
+            </a:lvl5pPr>
+            <a:lvl6pPr marR="0" lvl="5" algn="l" rtl="0">
+              <a:lnSpc>
+                <a:spcPct val="100000"/>
+              </a:lnSpc>
+              <a:spcBef>
+                <a:spcPts val="0"/>
+              </a:spcBef>
+              <a:spcAft>
+                <a:spcPts val="0"/>
+              </a:spcAft>
+              <a:buClr>
+                <a:schemeClr val="dk1"/>
+              </a:buClr>
+              <a:buSzPts val="3200"/>
+              <a:buFont typeface="Tajawal"/>
+              <a:buNone/>
+              <a:defRPr sz="3200" b="1" i="0" u="none" strike="noStrike" cap="none">
+                <a:solidFill>
+                  <a:schemeClr val="dk1"/>
+                </a:solidFill>
+                <a:latin typeface="Tajawal"/>
+                <a:ea typeface="Tajawal"/>
+                <a:cs typeface="Tajawal"/>
+                <a:sym typeface="Tajawal"/>
+              </a:defRPr>
+            </a:lvl6pPr>
+            <a:lvl7pPr marR="0" lvl="6" algn="l" rtl="0">
+              <a:lnSpc>
+                <a:spcPct val="100000"/>
+              </a:lnSpc>
+              <a:spcBef>
+                <a:spcPts val="0"/>
+              </a:spcBef>
+              <a:spcAft>
+                <a:spcPts val="0"/>
+              </a:spcAft>
+              <a:buClr>
+                <a:schemeClr val="dk1"/>
+              </a:buClr>
+              <a:buSzPts val="3200"/>
+              <a:buFont typeface="Tajawal"/>
+              <a:buNone/>
+              <a:defRPr sz="3200" b="1" i="0" u="none" strike="noStrike" cap="none">
+                <a:solidFill>
+                  <a:schemeClr val="dk1"/>
+                </a:solidFill>
+                <a:latin typeface="Tajawal"/>
+                <a:ea typeface="Tajawal"/>
+                <a:cs typeface="Tajawal"/>
+                <a:sym typeface="Tajawal"/>
+              </a:defRPr>
+            </a:lvl7pPr>
+            <a:lvl8pPr marR="0" lvl="7" algn="l" rtl="0">
+              <a:lnSpc>
+                <a:spcPct val="100000"/>
+              </a:lnSpc>
+              <a:spcBef>
+                <a:spcPts val="0"/>
+              </a:spcBef>
+              <a:spcAft>
+                <a:spcPts val="0"/>
+              </a:spcAft>
+              <a:buClr>
+                <a:schemeClr val="dk1"/>
+              </a:buClr>
+              <a:buSzPts val="3200"/>
+              <a:buFont typeface="Tajawal"/>
+              <a:buNone/>
+              <a:defRPr sz="3200" b="1" i="0" u="none" strike="noStrike" cap="none">
+                <a:solidFill>
+                  <a:schemeClr val="dk1"/>
+                </a:solidFill>
+                <a:latin typeface="Tajawal"/>
+                <a:ea typeface="Tajawal"/>
+                <a:cs typeface="Tajawal"/>
+                <a:sym typeface="Tajawal"/>
+              </a:defRPr>
+            </a:lvl8pPr>
+            <a:lvl9pPr marR="0" lvl="8" algn="l" rtl="0">
+              <a:lnSpc>
+                <a:spcPct val="100000"/>
+              </a:lnSpc>
+              <a:spcBef>
+                <a:spcPts val="0"/>
+              </a:spcBef>
+              <a:spcAft>
+                <a:spcPts val="0"/>
+              </a:spcAft>
+              <a:buClr>
+                <a:schemeClr val="dk1"/>
+              </a:buClr>
+              <a:buSzPts val="3200"/>
+              <a:buFont typeface="Tajawal"/>
+              <a:buNone/>
+              <a:defRPr sz="3200" b="1" i="0" u="none" strike="noStrike" cap="none">
+                <a:solidFill>
+                  <a:schemeClr val="dk1"/>
+                </a:solidFill>
+                <a:latin typeface="Tajawal"/>
+                <a:ea typeface="Tajawal"/>
+                <a:cs typeface="Tajawal"/>
+                <a:sym typeface="Tajawal"/>
+              </a:defRPr>
+            </a:lvl9pPr>
+          </a:lstStyle>
+          <a:p>
+            <a:r>
+              <a:rPr lang="en-GB" dirty="0"/>
+              <a:t>RE, Tokenization, stemming</a:t>
+            </a:r>
+          </a:p>
+        </p:txBody>
+      </p:sp>
+      <p:pic>
+        <p:nvPicPr>
+          <p:cNvPr id="6" name="Picture 5" descr="A picture containing circle&#10;&#10;Description automatically generated">
+            <a:extLst>
+              <a:ext uri="{FF2B5EF4-FFF2-40B4-BE49-F238E27FC236}">
+                <a16:creationId xmlns:a16="http://schemas.microsoft.com/office/drawing/2014/main" id="{BCC1A354-C16D-AB32-B9A9-8A5FA86E74F5}"/>
+              </a:ext>
+            </a:extLst>
+          </p:cNvPr>
+          <p:cNvPicPr>
+            <a:picLocks noChangeAspect="1"/>
+          </p:cNvPicPr>
+          <p:nvPr/>
+        </p:nvPicPr>
+        <p:blipFill>
+          <a:blip r:embed="rId4"/>
+          <a:stretch>
+            <a:fillRect/>
+          </a:stretch>
+        </p:blipFill>
+        <p:spPr>
+          <a:xfrm>
+            <a:off x="7820528" y="132735"/>
+            <a:ext cx="1258284" cy="677376"/>
+          </a:xfrm>
+          <a:prstGeom prst="rect">
+            <a:avLst/>
+          </a:prstGeom>
+        </p:spPr>
+      </p:pic>
+      <p:sp>
+        <p:nvSpPr>
+          <p:cNvPr id="8" name="Title 1">
+            <a:extLst>
+              <a:ext uri="{FF2B5EF4-FFF2-40B4-BE49-F238E27FC236}">
+                <a16:creationId xmlns:a16="http://schemas.microsoft.com/office/drawing/2014/main" id="{FAEE2A23-1D56-E547-5EF2-FA582DC6F459}"/>
+              </a:ext>
+            </a:extLst>
+          </p:cNvPr>
+          <p:cNvSpPr txBox="1">
+            <a:spLocks/>
+          </p:cNvSpPr>
+          <p:nvPr/>
+        </p:nvSpPr>
+        <p:spPr>
+          <a:xfrm>
+            <a:off x="731870" y="280427"/>
+            <a:ext cx="7717800" cy="572700"/>
+          </a:xfrm>
+          <a:prstGeom prst="rect">
+            <a:avLst/>
+          </a:prstGeom>
+          <a:noFill/>
+          <a:ln>
+            <a:noFill/>
+          </a:ln>
+        </p:spPr>
+        <p:txBody>
+          <a:bodyPr spcFirstLastPara="1" wrap="square" lIns="91425" tIns="91425" rIns="91425" bIns="91425" anchor="ctr" anchorCtr="0">
+            <a:noAutofit/>
+          </a:bodyPr>
+          <a:lstStyle>
+            <a:defPPr marR="0" lvl="0" algn="l" rtl="0">
+              <a:lnSpc>
+                <a:spcPct val="100000"/>
+              </a:lnSpc>
+              <a:spcBef>
+                <a:spcPts val="0"/>
+              </a:spcBef>
+              <a:spcAft>
+                <a:spcPts val="0"/>
+              </a:spcAft>
+            </a:defPPr>
+            <a:lvl1pPr marR="0" lvl="0" algn="l" rtl="0">
+              <a:lnSpc>
+                <a:spcPct val="100000"/>
+              </a:lnSpc>
+              <a:spcBef>
+                <a:spcPts val="0"/>
+              </a:spcBef>
+              <a:spcAft>
+                <a:spcPts val="0"/>
+              </a:spcAft>
+              <a:buClr>
+                <a:schemeClr val="dk1"/>
+              </a:buClr>
+              <a:buSzPts val="3200"/>
+              <a:buFont typeface="Tajawal"/>
+              <a:buNone/>
+              <a:defRPr sz="3200" b="1" i="0" u="none" strike="noStrike" cap="none">
+                <a:solidFill>
+                  <a:schemeClr val="dk1"/>
+                </a:solidFill>
+                <a:latin typeface="Tajawal"/>
+                <a:ea typeface="Tajawal"/>
+                <a:cs typeface="Tajawal"/>
+                <a:sym typeface="Tajawal"/>
+              </a:defRPr>
+            </a:lvl1pPr>
+            <a:lvl2pPr marR="0" lvl="1" algn="l" rtl="0">
+              <a:lnSpc>
+                <a:spcPct val="100000"/>
+              </a:lnSpc>
+              <a:spcBef>
+                <a:spcPts val="0"/>
+              </a:spcBef>
+              <a:spcAft>
+                <a:spcPts val="0"/>
+              </a:spcAft>
+              <a:buClr>
+                <a:schemeClr val="dk1"/>
+              </a:buClr>
+              <a:buSzPts val="3200"/>
+              <a:buFont typeface="Tajawal"/>
+              <a:buNone/>
+              <a:defRPr sz="3200" b="1" i="0" u="none" strike="noStrike" cap="none">
+                <a:solidFill>
+                  <a:schemeClr val="dk1"/>
+                </a:solidFill>
+                <a:latin typeface="Tajawal"/>
+                <a:ea typeface="Tajawal"/>
+                <a:cs typeface="Tajawal"/>
+                <a:sym typeface="Tajawal"/>
+              </a:defRPr>
+            </a:lvl2pPr>
+            <a:lvl3pPr marR="0" lvl="2" algn="l" rtl="0">
+              <a:lnSpc>
+                <a:spcPct val="100000"/>
+              </a:lnSpc>
+              <a:spcBef>
+                <a:spcPts val="0"/>
+              </a:spcBef>
+              <a:spcAft>
+                <a:spcPts val="0"/>
+              </a:spcAft>
+              <a:buClr>
+                <a:schemeClr val="dk1"/>
+              </a:buClr>
+              <a:buSzPts val="3200"/>
+              <a:buFont typeface="Tajawal"/>
+              <a:buNone/>
+              <a:defRPr sz="3200" b="1" i="0" u="none" strike="noStrike" cap="none">
+                <a:solidFill>
+                  <a:schemeClr val="dk1"/>
+                </a:solidFill>
+                <a:latin typeface="Tajawal"/>
+                <a:ea typeface="Tajawal"/>
+                <a:cs typeface="Tajawal"/>
+                <a:sym typeface="Tajawal"/>
+              </a:defRPr>
+            </a:lvl3pPr>
+            <a:lvl4pPr marR="0" lvl="3" algn="l" rtl="0">
+              <a:lnSpc>
+                <a:spcPct val="100000"/>
+              </a:lnSpc>
+              <a:spcBef>
+                <a:spcPts val="0"/>
+              </a:spcBef>
+              <a:spcAft>
+                <a:spcPts val="0"/>
+              </a:spcAft>
+              <a:buClr>
+                <a:schemeClr val="dk1"/>
+              </a:buClr>
+              <a:buSzPts val="3200"/>
+              <a:buFont typeface="Tajawal"/>
+              <a:buNone/>
+              <a:defRPr sz="3200" b="1" i="0" u="none" strike="noStrike" cap="none">
+                <a:solidFill>
+                  <a:schemeClr val="dk1"/>
+                </a:solidFill>
+                <a:latin typeface="Tajawal"/>
+                <a:ea typeface="Tajawal"/>
+                <a:cs typeface="Tajawal"/>
+                <a:sym typeface="Tajawal"/>
+              </a:defRPr>
+            </a:lvl4pPr>
+            <a:lvl5pPr marR="0" lvl="4" algn="l" rtl="0">
+              <a:lnSpc>
+                <a:spcPct val="100000"/>
+              </a:lnSpc>
+              <a:spcBef>
+                <a:spcPts val="0"/>
+              </a:spcBef>
+              <a:spcAft>
+                <a:spcPts val="0"/>
+              </a:spcAft>
+              <a:buClr>
+                <a:schemeClr val="dk1"/>
+              </a:buClr>
+              <a:buSzPts val="3200"/>
+              <a:buFont typeface="Tajawal"/>
+              <a:buNone/>
+              <a:defRPr sz="3200" b="1" i="0" u="none" strike="noStrike" cap="none">
+                <a:solidFill>
+                  <a:schemeClr val="dk1"/>
+                </a:solidFill>
+                <a:latin typeface="Tajawal"/>
+                <a:ea typeface="Tajawal"/>
+                <a:cs typeface="Tajawal"/>
+                <a:sym typeface="Tajawal"/>
+              </a:defRPr>
+            </a:lvl5pPr>
+            <a:lvl6pPr marR="0" lvl="5" algn="l" rtl="0">
+              <a:lnSpc>
+                <a:spcPct val="100000"/>
+              </a:lnSpc>
+              <a:spcBef>
+                <a:spcPts val="0"/>
+              </a:spcBef>
+              <a:spcAft>
+                <a:spcPts val="0"/>
+              </a:spcAft>
+              <a:buClr>
+                <a:schemeClr val="dk1"/>
+              </a:buClr>
+              <a:buSzPts val="3200"/>
+              <a:buFont typeface="Tajawal"/>
+              <a:buNone/>
+              <a:defRPr sz="3200" b="1" i="0" u="none" strike="noStrike" cap="none">
+                <a:solidFill>
+                  <a:schemeClr val="dk1"/>
+                </a:solidFill>
+                <a:latin typeface="Tajawal"/>
+                <a:ea typeface="Tajawal"/>
+                <a:cs typeface="Tajawal"/>
+                <a:sym typeface="Tajawal"/>
+              </a:defRPr>
+            </a:lvl6pPr>
+            <a:lvl7pPr marR="0" lvl="6" algn="l" rtl="0">
+              <a:lnSpc>
+                <a:spcPct val="100000"/>
+              </a:lnSpc>
+              <a:spcBef>
+                <a:spcPts val="0"/>
+              </a:spcBef>
+              <a:spcAft>
+                <a:spcPts val="0"/>
+              </a:spcAft>
+              <a:buClr>
+                <a:schemeClr val="dk1"/>
+              </a:buClr>
+              <a:buSzPts val="3200"/>
+              <a:buFont typeface="Tajawal"/>
+              <a:buNone/>
+              <a:defRPr sz="3200" b="1" i="0" u="none" strike="noStrike" cap="none">
+                <a:solidFill>
+                  <a:schemeClr val="dk1"/>
+                </a:solidFill>
+                <a:latin typeface="Tajawal"/>
+                <a:ea typeface="Tajawal"/>
+                <a:cs typeface="Tajawal"/>
+                <a:sym typeface="Tajawal"/>
+              </a:defRPr>
+            </a:lvl7pPr>
+            <a:lvl8pPr marR="0" lvl="7" algn="l" rtl="0">
+              <a:lnSpc>
+                <a:spcPct val="100000"/>
+              </a:lnSpc>
+              <a:spcBef>
+                <a:spcPts val="0"/>
+              </a:spcBef>
+              <a:spcAft>
+                <a:spcPts val="0"/>
+              </a:spcAft>
+              <a:buClr>
+                <a:schemeClr val="dk1"/>
+              </a:buClr>
+              <a:buSzPts val="3200"/>
+              <a:buFont typeface="Tajawal"/>
+              <a:buNone/>
+              <a:defRPr sz="3200" b="1" i="0" u="none" strike="noStrike" cap="none">
+                <a:solidFill>
+                  <a:schemeClr val="dk1"/>
+                </a:solidFill>
+                <a:latin typeface="Tajawal"/>
+                <a:ea typeface="Tajawal"/>
+                <a:cs typeface="Tajawal"/>
+                <a:sym typeface="Tajawal"/>
+              </a:defRPr>
+            </a:lvl8pPr>
+            <a:lvl9pPr marR="0" lvl="8" algn="l" rtl="0">
+              <a:lnSpc>
+                <a:spcPct val="100000"/>
+              </a:lnSpc>
+              <a:spcBef>
+                <a:spcPts val="0"/>
+              </a:spcBef>
+              <a:spcAft>
+                <a:spcPts val="0"/>
+              </a:spcAft>
+              <a:buClr>
+                <a:schemeClr val="dk1"/>
+              </a:buClr>
+              <a:buSzPts val="3200"/>
+              <a:buFont typeface="Tajawal"/>
+              <a:buNone/>
+              <a:defRPr sz="3200" b="1" i="0" u="none" strike="noStrike" cap="none">
+                <a:solidFill>
+                  <a:schemeClr val="dk1"/>
+                </a:solidFill>
+                <a:latin typeface="Tajawal"/>
+                <a:ea typeface="Tajawal"/>
+                <a:cs typeface="Tajawal"/>
+                <a:sym typeface="Tajawal"/>
+              </a:defRPr>
+            </a:lvl9pPr>
+          </a:lstStyle>
+          <a:p>
+            <a:r>
+              <a:rPr lang="it-IT" sz="1200" i="1" dirty="0">
+                <a:solidFill>
+                  <a:srgbClr val="00B050"/>
+                </a:solidFill>
+              </a:rPr>
+              <a:t>TEXT CLASSIFICATION – PRE-PROCESSING</a:t>
+            </a:r>
+            <a:endParaRPr lang="it-IT" i="1" dirty="0">
+              <a:solidFill>
+                <a:srgbClr val="00B050"/>
+              </a:solidFill>
+            </a:endParaRPr>
+          </a:p>
+        </p:txBody>
+      </p:sp>
+    </p:spTree>
+    <p:extLst>
+      <p:ext uri="{BB962C8B-B14F-4D97-AF65-F5344CB8AC3E}">
+        <p14:creationId xmlns:p14="http://schemas.microsoft.com/office/powerpoint/2010/main" val="4170826899"/>
+      </p:ext>
+    </p:extLst>
+  </p:cSld>
+  <p:clrMapOvr>
+    <a:masterClrMapping/>
+  </p:clrMapOvr>
+</p:sld>
+</file>
+
+<file path=ppt/slides/slide14.xml><?xml version="1.0" encoding="utf-8"?>
+<p:sld xmlns:a="http://schemas.openxmlformats.org/drawingml/2006/main" xmlns:r="http://schemas.openxmlformats.org/officeDocument/2006/relationships" xmlns:p="http://schemas.openxmlformats.org/presentationml/2006/main">
+  <p:cSld>
+    <p:bg>
+      <p:bgPr>
+        <a:blipFill dpi="0" rotWithShape="1">
+          <a:blip r:embed="rId3">
+            <a:lum/>
+          </a:blip>
+          <a:srcRect/>
+          <a:stretch>
+            <a:fillRect l="-10000" r="-10000"/>
+          </a:stretch>
+        </a:blipFill>
+        <a:effectLst/>
+      </p:bgPr>
+    </p:bg>
+    <p:spTree>
+      <p:nvGrpSpPr>
+        <p:cNvPr id="1" name="Shape 1342"/>
+        <p:cNvGrpSpPr/>
+        <p:nvPr/>
+      </p:nvGrpSpPr>
+      <p:grpSpPr>
+        <a:xfrm>
+          <a:off x="0" y="0"/>
+          <a:ext cx="0" cy="0"/>
+          <a:chOff x="0" y="0"/>
+          <a:chExt cx="0" cy="0"/>
+        </a:xfrm>
+      </p:grpSpPr>
+      <p:sp>
+        <p:nvSpPr>
+          <p:cNvPr id="14" name="Google Shape;1344;p38">
+            <a:extLst>
+              <a:ext uri="{FF2B5EF4-FFF2-40B4-BE49-F238E27FC236}">
+                <a16:creationId xmlns:a16="http://schemas.microsoft.com/office/drawing/2014/main" id="{980922C1-A395-6BB4-730E-83A8E1094A76}"/>
+              </a:ext>
+            </a:extLst>
+          </p:cNvPr>
+          <p:cNvSpPr txBox="1">
+            <a:spLocks/>
+          </p:cNvSpPr>
+          <p:nvPr/>
+        </p:nvSpPr>
+        <p:spPr>
+          <a:xfrm>
+            <a:off x="713100" y="1029100"/>
+            <a:ext cx="7839229" cy="3913346"/>
+          </a:xfrm>
+          <a:prstGeom prst="rect">
+            <a:avLst/>
+          </a:prstGeom>
+          <a:noFill/>
+          <a:ln>
+            <a:noFill/>
+          </a:ln>
+        </p:spPr>
+        <p:txBody>
+          <a:bodyPr spcFirstLastPara="1" wrap="square" lIns="91425" tIns="91425" rIns="91425" bIns="91425" anchor="t" anchorCtr="0">
+            <a:noAutofit/>
+          </a:bodyPr>
+          <a:lstStyle>
+            <a:defPPr marR="0" lvl="0" algn="l" rtl="0">
+              <a:lnSpc>
+                <a:spcPct val="100000"/>
+              </a:lnSpc>
+              <a:spcBef>
+                <a:spcPts val="0"/>
+              </a:spcBef>
+              <a:spcAft>
+                <a:spcPts val="0"/>
+              </a:spcAft>
+            </a:defPPr>
+            <a:lvl1pPr marL="457200" marR="0" lvl="0" indent="-304800" algn="l" rtl="0">
+              <a:lnSpc>
+                <a:spcPct val="100000"/>
+              </a:lnSpc>
+              <a:spcBef>
+                <a:spcPts val="0"/>
+              </a:spcBef>
+              <a:spcAft>
+                <a:spcPts val="0"/>
+              </a:spcAft>
+              <a:buClr>
+                <a:schemeClr val="accent2"/>
+              </a:buClr>
+              <a:buSzPts val="1200"/>
+              <a:buFont typeface="Roboto"/>
+              <a:buAutoNum type="arabicPeriod"/>
+              <a:defRPr sz="1200" b="0" i="0" u="none" strike="noStrike" cap="none">
+                <a:solidFill>
+                  <a:schemeClr val="dk1"/>
+                </a:solidFill>
+                <a:latin typeface="Roboto"/>
+                <a:ea typeface="Roboto"/>
+                <a:cs typeface="Roboto"/>
+                <a:sym typeface="Roboto"/>
+              </a:defRPr>
+            </a:lvl1pPr>
+            <a:lvl2pPr marL="914400" marR="0" lvl="1" indent="-304800" algn="l" rtl="0">
+              <a:lnSpc>
+                <a:spcPct val="115000"/>
+              </a:lnSpc>
+              <a:spcBef>
+                <a:spcPts val="0"/>
+              </a:spcBef>
+              <a:spcAft>
+                <a:spcPts val="0"/>
+              </a:spcAft>
+              <a:buClr>
+                <a:srgbClr val="434343"/>
+              </a:buClr>
+              <a:buSzPts val="1200"/>
+              <a:buFont typeface="Roboto Condensed Light"/>
+              <a:buAutoNum type="alphaLcPeriod"/>
+              <a:defRPr sz="1400" b="0" i="0" u="none" strike="noStrike" cap="none">
+                <a:solidFill>
+                  <a:schemeClr val="dk1"/>
+                </a:solidFill>
+                <a:latin typeface="Roboto"/>
+                <a:ea typeface="Roboto"/>
+                <a:cs typeface="Roboto"/>
+                <a:sym typeface="Roboto"/>
+              </a:defRPr>
+            </a:lvl2pPr>
+            <a:lvl3pPr marL="1371600" marR="0" lvl="2" indent="-304800" algn="l" rtl="0">
+              <a:lnSpc>
+                <a:spcPct val="115000"/>
+              </a:lnSpc>
+              <a:spcBef>
+                <a:spcPts val="0"/>
+              </a:spcBef>
+              <a:spcAft>
+                <a:spcPts val="0"/>
+              </a:spcAft>
+              <a:buClr>
+                <a:srgbClr val="434343"/>
+              </a:buClr>
+              <a:buSzPts val="1200"/>
+              <a:buFont typeface="Roboto Condensed Light"/>
+              <a:buAutoNum type="romanLcPeriod"/>
+              <a:defRPr sz="1400" b="0" i="0" u="none" strike="noStrike" cap="none">
+                <a:solidFill>
+                  <a:schemeClr val="dk1"/>
+                </a:solidFill>
+                <a:latin typeface="Roboto"/>
+                <a:ea typeface="Roboto"/>
+                <a:cs typeface="Roboto"/>
+                <a:sym typeface="Roboto"/>
+              </a:defRPr>
+            </a:lvl3pPr>
+            <a:lvl4pPr marL="1828800" marR="0" lvl="3" indent="-304800" algn="l" rtl="0">
+              <a:lnSpc>
+                <a:spcPct val="115000"/>
+              </a:lnSpc>
+              <a:spcBef>
+                <a:spcPts val="0"/>
+              </a:spcBef>
+              <a:spcAft>
+                <a:spcPts val="0"/>
+              </a:spcAft>
+              <a:buClr>
+                <a:srgbClr val="434343"/>
+              </a:buClr>
+              <a:buSzPts val="1200"/>
+              <a:buFont typeface="Roboto Condensed Light"/>
+              <a:buAutoNum type="arabicPeriod"/>
+              <a:defRPr sz="1400" b="0" i="0" u="none" strike="noStrike" cap="none">
+                <a:solidFill>
+                  <a:schemeClr val="dk1"/>
+                </a:solidFill>
+                <a:latin typeface="Roboto"/>
+                <a:ea typeface="Roboto"/>
+                <a:cs typeface="Roboto"/>
+                <a:sym typeface="Roboto"/>
+              </a:defRPr>
+            </a:lvl4pPr>
+            <a:lvl5pPr marL="2286000" marR="0" lvl="4" indent="-304800" algn="l" rtl="0">
+              <a:lnSpc>
+                <a:spcPct val="115000"/>
+              </a:lnSpc>
+              <a:spcBef>
+                <a:spcPts val="0"/>
+              </a:spcBef>
+              <a:spcAft>
+                <a:spcPts val="0"/>
+              </a:spcAft>
+              <a:buClr>
+                <a:srgbClr val="434343"/>
+              </a:buClr>
+              <a:buSzPts val="1200"/>
+              <a:buFont typeface="Roboto Condensed Light"/>
+              <a:buAutoNum type="alphaLcPeriod"/>
+              <a:defRPr sz="1400" b="0" i="0" u="none" strike="noStrike" cap="none">
+                <a:solidFill>
+                  <a:schemeClr val="dk1"/>
+                </a:solidFill>
+                <a:latin typeface="Roboto"/>
+                <a:ea typeface="Roboto"/>
+                <a:cs typeface="Roboto"/>
+                <a:sym typeface="Roboto"/>
+              </a:defRPr>
+            </a:lvl5pPr>
+            <a:lvl6pPr marL="2743200" marR="0" lvl="5" indent="-304800" algn="l" rtl="0">
+              <a:lnSpc>
+                <a:spcPct val="115000"/>
+              </a:lnSpc>
+              <a:spcBef>
+                <a:spcPts val="0"/>
+              </a:spcBef>
+              <a:spcAft>
+                <a:spcPts val="0"/>
+              </a:spcAft>
+              <a:buClr>
+                <a:srgbClr val="434343"/>
+              </a:buClr>
+              <a:buSzPts val="1200"/>
+              <a:buFont typeface="Roboto Condensed Light"/>
+              <a:buAutoNum type="romanLcPeriod"/>
+              <a:defRPr sz="1400" b="0" i="0" u="none" strike="noStrike" cap="none">
+                <a:solidFill>
+                  <a:schemeClr val="dk1"/>
+                </a:solidFill>
+                <a:latin typeface="Roboto"/>
+                <a:ea typeface="Roboto"/>
+                <a:cs typeface="Roboto"/>
+                <a:sym typeface="Roboto"/>
+              </a:defRPr>
+            </a:lvl6pPr>
+            <a:lvl7pPr marL="3200400" marR="0" lvl="6" indent="-304800" algn="l" rtl="0">
+              <a:lnSpc>
+                <a:spcPct val="115000"/>
+              </a:lnSpc>
+              <a:spcBef>
+                <a:spcPts val="0"/>
+              </a:spcBef>
+              <a:spcAft>
+                <a:spcPts val="0"/>
+              </a:spcAft>
+              <a:buClr>
+                <a:srgbClr val="434343"/>
+              </a:buClr>
+              <a:buSzPts val="1200"/>
+              <a:buFont typeface="Roboto Condensed Light"/>
+              <a:buAutoNum type="arabicPeriod"/>
+              <a:defRPr sz="1400" b="0" i="0" u="none" strike="noStrike" cap="none">
+                <a:solidFill>
+                  <a:schemeClr val="dk1"/>
+                </a:solidFill>
+                <a:latin typeface="Roboto"/>
+                <a:ea typeface="Roboto"/>
+                <a:cs typeface="Roboto"/>
+                <a:sym typeface="Roboto"/>
+              </a:defRPr>
+            </a:lvl7pPr>
+            <a:lvl8pPr marL="3657600" marR="0" lvl="7" indent="-304800" algn="l" rtl="0">
+              <a:lnSpc>
+                <a:spcPct val="115000"/>
+              </a:lnSpc>
+              <a:spcBef>
+                <a:spcPts val="0"/>
+              </a:spcBef>
+              <a:spcAft>
+                <a:spcPts val="0"/>
+              </a:spcAft>
+              <a:buClr>
+                <a:srgbClr val="434343"/>
+              </a:buClr>
+              <a:buSzPts val="1200"/>
+              <a:buFont typeface="Roboto Condensed Light"/>
+              <a:buAutoNum type="alphaLcPeriod"/>
+              <a:defRPr sz="1400" b="0" i="0" u="none" strike="noStrike" cap="none">
+                <a:solidFill>
+                  <a:schemeClr val="dk1"/>
+                </a:solidFill>
+                <a:latin typeface="Roboto"/>
+                <a:ea typeface="Roboto"/>
+                <a:cs typeface="Roboto"/>
+                <a:sym typeface="Roboto"/>
+              </a:defRPr>
+            </a:lvl8pPr>
+            <a:lvl9pPr marL="4114800" marR="0" lvl="8" indent="-304800" algn="l" rtl="0">
+              <a:lnSpc>
+                <a:spcPct val="115000"/>
+              </a:lnSpc>
+              <a:spcBef>
+                <a:spcPts val="0"/>
+              </a:spcBef>
+              <a:spcAft>
+                <a:spcPts val="0"/>
+              </a:spcAft>
+              <a:buClr>
+                <a:srgbClr val="434343"/>
+              </a:buClr>
+              <a:buSzPts val="1200"/>
+              <a:buFont typeface="Roboto Condensed Light"/>
+              <a:buAutoNum type="romanLcPeriod"/>
+              <a:defRPr sz="1400" b="0" i="0" u="none" strike="noStrike" cap="none">
+                <a:solidFill>
+                  <a:schemeClr val="dk1"/>
+                </a:solidFill>
+                <a:latin typeface="Roboto"/>
+                <a:ea typeface="Roboto"/>
+                <a:cs typeface="Roboto"/>
+                <a:sym typeface="Roboto"/>
+              </a:defRPr>
+            </a:lvl9pPr>
+          </a:lstStyle>
+          <a:p>
+            <a:pPr marL="0" indent="0">
+              <a:buClr>
+                <a:schemeClr val="dk1"/>
+              </a:buClr>
+              <a:buSzPts val="1100"/>
+              <a:buNone/>
+            </a:pPr>
+            <a:r>
+              <a:rPr lang="en-GB" sz="1600" dirty="0"/>
+              <a:t>The below steps are followed for each document found in the dataset. </a:t>
+            </a:r>
+          </a:p>
+          <a:p>
+            <a:pPr marL="0" indent="0">
+              <a:buClr>
+                <a:schemeClr val="dk1"/>
+              </a:buClr>
+              <a:buSzPts val="1100"/>
+              <a:buNone/>
+            </a:pPr>
+            <a:endParaRPr lang="en-GB" sz="1600" dirty="0"/>
+          </a:p>
+          <a:p>
+            <a:pPr marL="0" indent="0">
+              <a:buClr>
+                <a:schemeClr val="dk1"/>
+              </a:buClr>
+              <a:buSzPts val="1100"/>
+              <a:buNone/>
+            </a:pPr>
+            <a:r>
+              <a:rPr lang="en-GB" sz="1600" dirty="0"/>
+              <a:t>Punctuations and numbers don’t help much in processing the given text, if included, they will just increase the size of a bag of words that we will create as the last step and decrease the efficiency of an algorithm.</a:t>
+            </a:r>
+          </a:p>
+          <a:p>
+            <a:pPr marL="0" indent="0">
+              <a:buClr>
+                <a:schemeClr val="dk1"/>
+              </a:buClr>
+              <a:buSzPts val="1100"/>
+              <a:buNone/>
+            </a:pPr>
+            <a:r>
+              <a:rPr lang="en-GB" sz="1600" dirty="0"/>
+              <a:t>So, punctuation and numbers are removed from the text using regular expressions. </a:t>
+            </a:r>
+          </a:p>
+          <a:p>
+            <a:pPr marL="0" indent="0">
+              <a:buClr>
+                <a:schemeClr val="dk1"/>
+              </a:buClr>
+              <a:buSzPts val="1100"/>
+              <a:buNone/>
+            </a:pPr>
+            <a:endParaRPr lang="en-GB" sz="1600" dirty="0"/>
+          </a:p>
+          <a:p>
+            <a:pPr marL="0" indent="0">
+              <a:buClr>
+                <a:schemeClr val="dk1"/>
+              </a:buClr>
+              <a:buSzPts val="1100"/>
+              <a:buNone/>
+            </a:pPr>
+            <a:r>
+              <a:rPr lang="en-GB" sz="1600" dirty="0"/>
+              <a:t>After that, the document is tokenized and stop words are removed from the list of tokens (stop words filtering).</a:t>
+            </a:r>
+          </a:p>
+          <a:p>
+            <a:pPr marL="0" indent="0">
+              <a:buClr>
+                <a:schemeClr val="dk1"/>
+              </a:buClr>
+              <a:buSzPts val="1100"/>
+              <a:buNone/>
+            </a:pPr>
+            <a:endParaRPr lang="en-GB" sz="1600" dirty="0"/>
+          </a:p>
+          <a:p>
+            <a:pPr marL="0" indent="0">
+              <a:buClr>
+                <a:schemeClr val="dk1"/>
+              </a:buClr>
+              <a:buSzPts val="1100"/>
+              <a:buNone/>
+            </a:pPr>
+            <a:r>
+              <a:rPr lang="en-GB" sz="1600" dirty="0"/>
+              <a:t>The last phase is the stemming, so for each token is taken its root word.</a:t>
+            </a:r>
+          </a:p>
+          <a:p>
+            <a:pPr marL="0" indent="0">
+              <a:buClr>
+                <a:schemeClr val="dk1"/>
+              </a:buClr>
+              <a:buSzPts val="1100"/>
+              <a:buNone/>
+            </a:pPr>
+            <a:endParaRPr lang="en-GB" sz="1600" dirty="0"/>
+          </a:p>
+        </p:txBody>
+      </p:sp>
+      <p:grpSp>
+        <p:nvGrpSpPr>
+          <p:cNvPr id="1362" name="Google Shape;1362;p38"/>
+          <p:cNvGrpSpPr/>
+          <p:nvPr/>
+        </p:nvGrpSpPr>
+        <p:grpSpPr>
+          <a:xfrm rot="1796183">
+            <a:off x="-280957" y="4547452"/>
+            <a:ext cx="957552" cy="766847"/>
+            <a:chOff x="4365025" y="1539800"/>
+            <a:chExt cx="121025" cy="96925"/>
+          </a:xfrm>
+        </p:grpSpPr>
+        <p:sp>
+          <p:nvSpPr>
+            <p:cNvPr id="1363" name="Google Shape;1363;p38"/>
+            <p:cNvSpPr/>
+            <p:nvPr/>
+          </p:nvSpPr>
+          <p:spPr>
+            <a:xfrm>
+              <a:off x="4365025" y="1587950"/>
+              <a:ext cx="30125" cy="19500"/>
+            </a:xfrm>
+            <a:custGeom>
+              <a:avLst/>
+              <a:gdLst/>
+              <a:ahLst/>
+              <a:cxnLst/>
+              <a:rect l="l" t="t" r="r" b="b"/>
+              <a:pathLst>
+                <a:path w="1205" h="780" extrusionOk="0">
+                  <a:moveTo>
+                    <a:pt x="786" y="0"/>
+                  </a:moveTo>
+                  <a:cubicBezTo>
+                    <a:pt x="525" y="3"/>
+                    <a:pt x="1" y="135"/>
+                    <a:pt x="70" y="487"/>
+                  </a:cubicBezTo>
+                  <a:cubicBezTo>
+                    <a:pt x="112" y="700"/>
+                    <a:pt x="344" y="779"/>
+                    <a:pt x="555" y="779"/>
+                  </a:cubicBezTo>
+                  <a:cubicBezTo>
+                    <a:pt x="632" y="779"/>
+                    <a:pt x="705" y="769"/>
+                    <a:pt x="766" y="751"/>
+                  </a:cubicBezTo>
+                  <a:cubicBezTo>
+                    <a:pt x="949" y="699"/>
+                    <a:pt x="1204" y="525"/>
+                    <a:pt x="1147" y="307"/>
+                  </a:cubicBezTo>
+                  <a:cubicBezTo>
+                    <a:pt x="1115" y="184"/>
+                    <a:pt x="929" y="49"/>
+                    <a:pt x="786" y="0"/>
+                  </a:cubicBezTo>
+                  <a:close/>
+                </a:path>
+              </a:pathLst>
+            </a:custGeom>
+            <a:solidFill>
+              <a:schemeClr val="accent4"/>
+            </a:solidFill>
+            <a:ln>
+              <a:noFill/>
+            </a:ln>
+          </p:spPr>
+          <p:txBody>
+            <a:bodyPr spcFirstLastPara="1" wrap="square" lIns="91425" tIns="91425" rIns="91425" bIns="91425" anchor="ctr" anchorCtr="0">
+              <a:noAutofit/>
+            </a:bodyPr>
+            <a:lstStyle/>
+            <a:p>
+              <a:pPr marL="0" lvl="0" indent="0" algn="l" rtl="0">
+                <a:spcBef>
+                  <a:spcPts val="0"/>
+                </a:spcBef>
+                <a:spcAft>
+                  <a:spcPts val="0"/>
+                </a:spcAft>
+                <a:buNone/>
+              </a:pPr>
+              <a:endParaRPr/>
+            </a:p>
+          </p:txBody>
+        </p:sp>
+        <p:sp>
+          <p:nvSpPr>
+            <p:cNvPr id="1364" name="Google Shape;1364;p38"/>
+            <p:cNvSpPr/>
+            <p:nvPr/>
+          </p:nvSpPr>
+          <p:spPr>
+            <a:xfrm>
+              <a:off x="4407850" y="1579225"/>
+              <a:ext cx="22750" cy="14925"/>
+            </a:xfrm>
+            <a:custGeom>
+              <a:avLst/>
+              <a:gdLst/>
+              <a:ahLst/>
+              <a:cxnLst/>
+              <a:rect l="l" t="t" r="r" b="b"/>
+              <a:pathLst>
+                <a:path w="910" h="597" extrusionOk="0">
+                  <a:moveTo>
+                    <a:pt x="581" y="0"/>
+                  </a:moveTo>
+                  <a:cubicBezTo>
+                    <a:pt x="571" y="0"/>
+                    <a:pt x="561" y="1"/>
+                    <a:pt x="551" y="3"/>
+                  </a:cubicBezTo>
+                  <a:lnTo>
+                    <a:pt x="594" y="8"/>
+                  </a:lnTo>
+                  <a:cubicBezTo>
+                    <a:pt x="1" y="8"/>
+                    <a:pt x="140" y="596"/>
+                    <a:pt x="475" y="596"/>
+                  </a:cubicBezTo>
+                  <a:cubicBezTo>
+                    <a:pt x="531" y="596"/>
+                    <a:pt x="593" y="580"/>
+                    <a:pt x="657" y="541"/>
+                  </a:cubicBezTo>
+                  <a:cubicBezTo>
+                    <a:pt x="801" y="455"/>
+                    <a:pt x="909" y="343"/>
+                    <a:pt x="832" y="180"/>
+                  </a:cubicBezTo>
+                  <a:cubicBezTo>
+                    <a:pt x="788" y="81"/>
+                    <a:pt x="686" y="0"/>
+                    <a:pt x="581" y="0"/>
+                  </a:cubicBezTo>
+                  <a:close/>
+                </a:path>
+              </a:pathLst>
+            </a:custGeom>
+            <a:solidFill>
+              <a:schemeClr val="accent4"/>
+            </a:solidFill>
+            <a:ln>
+              <a:noFill/>
+            </a:ln>
+          </p:spPr>
+          <p:txBody>
+            <a:bodyPr spcFirstLastPara="1" wrap="square" lIns="91425" tIns="91425" rIns="91425" bIns="91425" anchor="ctr" anchorCtr="0">
+              <a:noAutofit/>
+            </a:bodyPr>
+            <a:lstStyle/>
+            <a:p>
+              <a:pPr marL="0" lvl="0" indent="0" algn="l" rtl="0">
+                <a:spcBef>
+                  <a:spcPts val="0"/>
+                </a:spcBef>
+                <a:spcAft>
+                  <a:spcPts val="0"/>
+                </a:spcAft>
+                <a:buNone/>
+              </a:pPr>
+              <a:endParaRPr/>
+            </a:p>
+          </p:txBody>
+        </p:sp>
+        <p:sp>
+          <p:nvSpPr>
+            <p:cNvPr id="1365" name="Google Shape;1365;p38"/>
+            <p:cNvSpPr/>
+            <p:nvPr/>
+          </p:nvSpPr>
+          <p:spPr>
+            <a:xfrm>
+              <a:off x="4403900" y="1617025"/>
+              <a:ext cx="28200" cy="19700"/>
+            </a:xfrm>
+            <a:custGeom>
+              <a:avLst/>
+              <a:gdLst/>
+              <a:ahLst/>
+              <a:cxnLst/>
+              <a:rect l="l" t="t" r="r" b="b"/>
+              <a:pathLst>
+                <a:path w="1128" h="788" extrusionOk="0">
+                  <a:moveTo>
+                    <a:pt x="649" y="0"/>
+                  </a:moveTo>
+                  <a:cubicBezTo>
+                    <a:pt x="0" y="101"/>
+                    <a:pt x="230" y="788"/>
+                    <a:pt x="599" y="788"/>
+                  </a:cubicBezTo>
+                  <a:cubicBezTo>
+                    <a:pt x="681" y="788"/>
+                    <a:pt x="770" y="754"/>
+                    <a:pt x="858" y="671"/>
+                  </a:cubicBezTo>
+                  <a:cubicBezTo>
+                    <a:pt x="1128" y="416"/>
+                    <a:pt x="921" y="141"/>
+                    <a:pt x="649" y="0"/>
+                  </a:cubicBezTo>
+                  <a:close/>
+                </a:path>
+              </a:pathLst>
+            </a:custGeom>
+            <a:solidFill>
+              <a:schemeClr val="accent4"/>
+            </a:solidFill>
+            <a:ln>
+              <a:noFill/>
+            </a:ln>
+          </p:spPr>
+          <p:txBody>
+            <a:bodyPr spcFirstLastPara="1" wrap="square" lIns="91425" tIns="91425" rIns="91425" bIns="91425" anchor="ctr" anchorCtr="0">
+              <a:noAutofit/>
+            </a:bodyPr>
+            <a:lstStyle/>
+            <a:p>
+              <a:pPr marL="0" lvl="0" indent="0" algn="l" rtl="0">
+                <a:spcBef>
+                  <a:spcPts val="0"/>
+                </a:spcBef>
+                <a:spcAft>
+                  <a:spcPts val="0"/>
+                </a:spcAft>
+                <a:buNone/>
+              </a:pPr>
+              <a:endParaRPr/>
+            </a:p>
+          </p:txBody>
+        </p:sp>
+        <p:sp>
+          <p:nvSpPr>
+            <p:cNvPr id="1366" name="Google Shape;1366;p38"/>
+            <p:cNvSpPr/>
+            <p:nvPr/>
+          </p:nvSpPr>
+          <p:spPr>
+            <a:xfrm>
+              <a:off x="4449625" y="1610200"/>
+              <a:ext cx="13700" cy="15800"/>
+            </a:xfrm>
+            <a:custGeom>
+              <a:avLst/>
+              <a:gdLst/>
+              <a:ahLst/>
+              <a:cxnLst/>
+              <a:rect l="l" t="t" r="r" b="b"/>
+              <a:pathLst>
+                <a:path w="548" h="632" extrusionOk="0">
+                  <a:moveTo>
+                    <a:pt x="299" y="0"/>
+                  </a:moveTo>
+                  <a:cubicBezTo>
+                    <a:pt x="274" y="0"/>
+                    <a:pt x="251" y="8"/>
+                    <a:pt x="230" y="27"/>
+                  </a:cubicBezTo>
+                  <a:lnTo>
+                    <a:pt x="207" y="59"/>
+                  </a:lnTo>
+                  <a:cubicBezTo>
+                    <a:pt x="78" y="248"/>
+                    <a:pt x="1" y="468"/>
+                    <a:pt x="213" y="632"/>
+                  </a:cubicBezTo>
+                  <a:cubicBezTo>
+                    <a:pt x="359" y="563"/>
+                    <a:pt x="548" y="408"/>
+                    <a:pt x="519" y="225"/>
+                  </a:cubicBezTo>
+                  <a:cubicBezTo>
+                    <a:pt x="505" y="131"/>
+                    <a:pt x="396" y="0"/>
+                    <a:pt x="299" y="0"/>
+                  </a:cubicBezTo>
+                  <a:close/>
+                </a:path>
+              </a:pathLst>
+            </a:custGeom>
+            <a:solidFill>
+              <a:schemeClr val="accent4"/>
+            </a:solidFill>
+            <a:ln>
+              <a:noFill/>
+            </a:ln>
+          </p:spPr>
+          <p:txBody>
+            <a:bodyPr spcFirstLastPara="1" wrap="square" lIns="91425" tIns="91425" rIns="91425" bIns="91425" anchor="ctr" anchorCtr="0">
+              <a:noAutofit/>
+            </a:bodyPr>
+            <a:lstStyle/>
+            <a:p>
+              <a:pPr marL="0" lvl="0" indent="0" algn="l" rtl="0">
+                <a:spcBef>
+                  <a:spcPts val="0"/>
+                </a:spcBef>
+                <a:spcAft>
+                  <a:spcPts val="0"/>
+                </a:spcAft>
+                <a:buNone/>
+              </a:pPr>
+              <a:endParaRPr/>
+            </a:p>
+          </p:txBody>
+        </p:sp>
+        <p:sp>
+          <p:nvSpPr>
+            <p:cNvPr id="1367" name="Google Shape;1367;p38"/>
+            <p:cNvSpPr/>
+            <p:nvPr/>
+          </p:nvSpPr>
+          <p:spPr>
+            <a:xfrm>
+              <a:off x="4388575" y="1553100"/>
+              <a:ext cx="24300" cy="10400"/>
+            </a:xfrm>
+            <a:custGeom>
+              <a:avLst/>
+              <a:gdLst/>
+              <a:ahLst/>
+              <a:cxnLst/>
+              <a:rect l="l" t="t" r="r" b="b"/>
+              <a:pathLst>
+                <a:path w="972" h="416" extrusionOk="0">
+                  <a:moveTo>
+                    <a:pt x="577" y="1"/>
+                  </a:moveTo>
+                  <a:cubicBezTo>
+                    <a:pt x="297" y="1"/>
+                    <a:pt x="1" y="289"/>
+                    <a:pt x="403" y="400"/>
+                  </a:cubicBezTo>
+                  <a:cubicBezTo>
+                    <a:pt x="440" y="410"/>
+                    <a:pt x="477" y="415"/>
+                    <a:pt x="514" y="415"/>
+                  </a:cubicBezTo>
+                  <a:cubicBezTo>
+                    <a:pt x="764" y="415"/>
+                    <a:pt x="972" y="196"/>
+                    <a:pt x="692" y="19"/>
+                  </a:cubicBezTo>
+                  <a:cubicBezTo>
+                    <a:pt x="655" y="6"/>
+                    <a:pt x="616" y="1"/>
+                    <a:pt x="577" y="1"/>
+                  </a:cubicBezTo>
+                  <a:close/>
+                </a:path>
+              </a:pathLst>
+            </a:custGeom>
+            <a:solidFill>
+              <a:schemeClr val="accent4"/>
+            </a:solidFill>
+            <a:ln>
+              <a:noFill/>
+            </a:ln>
+          </p:spPr>
+          <p:txBody>
+            <a:bodyPr spcFirstLastPara="1" wrap="square" lIns="91425" tIns="91425" rIns="91425" bIns="91425" anchor="ctr" anchorCtr="0">
+              <a:noAutofit/>
+            </a:bodyPr>
+            <a:lstStyle/>
+            <a:p>
+              <a:pPr marL="0" lvl="0" indent="0" algn="l" rtl="0">
+                <a:spcBef>
+                  <a:spcPts val="0"/>
+                </a:spcBef>
+                <a:spcAft>
+                  <a:spcPts val="0"/>
+                </a:spcAft>
+                <a:buNone/>
+              </a:pPr>
+              <a:endParaRPr/>
+            </a:p>
+          </p:txBody>
+        </p:sp>
+        <p:sp>
+          <p:nvSpPr>
+            <p:cNvPr id="1368" name="Google Shape;1368;p38"/>
+            <p:cNvSpPr/>
+            <p:nvPr/>
+          </p:nvSpPr>
+          <p:spPr>
+            <a:xfrm>
+              <a:off x="4457500" y="1582775"/>
+              <a:ext cx="13600" cy="7825"/>
+            </a:xfrm>
+            <a:custGeom>
+              <a:avLst/>
+              <a:gdLst/>
+              <a:ahLst/>
+              <a:cxnLst/>
+              <a:rect l="l" t="t" r="r" b="b"/>
+              <a:pathLst>
+                <a:path w="544" h="313" extrusionOk="0">
+                  <a:moveTo>
+                    <a:pt x="362" y="1"/>
+                  </a:moveTo>
+                  <a:cubicBezTo>
+                    <a:pt x="264" y="27"/>
+                    <a:pt x="1" y="67"/>
+                    <a:pt x="35" y="216"/>
+                  </a:cubicBezTo>
+                  <a:cubicBezTo>
+                    <a:pt x="51" y="296"/>
+                    <a:pt x="119" y="313"/>
+                    <a:pt x="186" y="313"/>
+                  </a:cubicBezTo>
+                  <a:cubicBezTo>
+                    <a:pt x="212" y="313"/>
+                    <a:pt x="239" y="310"/>
+                    <a:pt x="261" y="307"/>
+                  </a:cubicBezTo>
+                  <a:cubicBezTo>
+                    <a:pt x="345" y="299"/>
+                    <a:pt x="516" y="262"/>
+                    <a:pt x="534" y="153"/>
+                  </a:cubicBezTo>
+                  <a:cubicBezTo>
+                    <a:pt x="543" y="91"/>
+                    <a:pt x="467" y="11"/>
+                    <a:pt x="400" y="11"/>
+                  </a:cubicBezTo>
+                  <a:cubicBezTo>
+                    <a:pt x="389" y="11"/>
+                    <a:pt x="378" y="13"/>
+                    <a:pt x="367" y="18"/>
+                  </a:cubicBezTo>
+                  <a:lnTo>
+                    <a:pt x="362" y="1"/>
+                  </a:lnTo>
+                  <a:close/>
+                </a:path>
+              </a:pathLst>
+            </a:custGeom>
+            <a:solidFill>
+              <a:schemeClr val="accent4"/>
+            </a:solidFill>
+            <a:ln>
+              <a:noFill/>
+            </a:ln>
+          </p:spPr>
+          <p:txBody>
+            <a:bodyPr spcFirstLastPara="1" wrap="square" lIns="91425" tIns="91425" rIns="91425" bIns="91425" anchor="ctr" anchorCtr="0">
+              <a:noAutofit/>
+            </a:bodyPr>
+            <a:lstStyle/>
+            <a:p>
+              <a:pPr marL="0" lvl="0" indent="0" algn="l" rtl="0">
+                <a:spcBef>
+                  <a:spcPts val="0"/>
+                </a:spcBef>
+                <a:spcAft>
+                  <a:spcPts val="0"/>
+                </a:spcAft>
+                <a:buNone/>
+              </a:pPr>
+              <a:endParaRPr/>
+            </a:p>
+          </p:txBody>
+        </p:sp>
+        <p:sp>
+          <p:nvSpPr>
+            <p:cNvPr id="1369" name="Google Shape;1369;p38"/>
+            <p:cNvSpPr/>
+            <p:nvPr/>
+          </p:nvSpPr>
+          <p:spPr>
+            <a:xfrm>
+              <a:off x="4436600" y="1539800"/>
+              <a:ext cx="15925" cy="12850"/>
+            </a:xfrm>
+            <a:custGeom>
+              <a:avLst/>
+              <a:gdLst/>
+              <a:ahLst/>
+              <a:cxnLst/>
+              <a:rect l="l" t="t" r="r" b="b"/>
+              <a:pathLst>
+                <a:path w="637" h="514" extrusionOk="0">
+                  <a:moveTo>
+                    <a:pt x="473" y="1"/>
+                  </a:moveTo>
+                  <a:lnTo>
+                    <a:pt x="473" y="1"/>
+                  </a:lnTo>
+                  <a:cubicBezTo>
+                    <a:pt x="307" y="21"/>
+                    <a:pt x="0" y="196"/>
+                    <a:pt x="83" y="405"/>
+                  </a:cubicBezTo>
+                  <a:cubicBezTo>
+                    <a:pt x="115" y="484"/>
+                    <a:pt x="170" y="514"/>
+                    <a:pt x="230" y="514"/>
+                  </a:cubicBezTo>
+                  <a:cubicBezTo>
+                    <a:pt x="297" y="514"/>
+                    <a:pt x="370" y="478"/>
+                    <a:pt x="427" y="433"/>
+                  </a:cubicBezTo>
+                  <a:cubicBezTo>
+                    <a:pt x="570" y="319"/>
+                    <a:pt x="636" y="113"/>
+                    <a:pt x="473" y="1"/>
+                  </a:cubicBezTo>
+                  <a:close/>
+                </a:path>
+              </a:pathLst>
+            </a:custGeom>
+            <a:solidFill>
+              <a:schemeClr val="accent4"/>
+            </a:solidFill>
+            <a:ln>
+              <a:noFill/>
+            </a:ln>
+          </p:spPr>
+          <p:txBody>
+            <a:bodyPr spcFirstLastPara="1" wrap="square" lIns="91425" tIns="91425" rIns="91425" bIns="91425" anchor="ctr" anchorCtr="0">
+              <a:noAutofit/>
+            </a:bodyPr>
+            <a:lstStyle/>
+            <a:p>
+              <a:pPr marL="0" lvl="0" indent="0" algn="l" rtl="0">
+                <a:spcBef>
+                  <a:spcPts val="0"/>
+                </a:spcBef>
+                <a:spcAft>
+                  <a:spcPts val="0"/>
+                </a:spcAft>
+                <a:buNone/>
+              </a:pPr>
+              <a:endParaRPr/>
+            </a:p>
+          </p:txBody>
+        </p:sp>
+        <p:sp>
+          <p:nvSpPr>
+            <p:cNvPr id="1370" name="Google Shape;1370;p38"/>
+            <p:cNvSpPr/>
+            <p:nvPr/>
+          </p:nvSpPr>
+          <p:spPr>
+            <a:xfrm>
+              <a:off x="4472250" y="1549775"/>
+              <a:ext cx="13800" cy="12175"/>
+            </a:xfrm>
+            <a:custGeom>
+              <a:avLst/>
+              <a:gdLst/>
+              <a:ahLst/>
+              <a:cxnLst/>
+              <a:rect l="l" t="t" r="r" b="b"/>
+              <a:pathLst>
+                <a:path w="552" h="487" extrusionOk="0">
+                  <a:moveTo>
+                    <a:pt x="359" y="0"/>
+                  </a:moveTo>
+                  <a:lnTo>
+                    <a:pt x="359" y="0"/>
+                  </a:lnTo>
+                  <a:cubicBezTo>
+                    <a:pt x="239" y="37"/>
+                    <a:pt x="1" y="161"/>
+                    <a:pt x="18" y="315"/>
+                  </a:cubicBezTo>
+                  <a:cubicBezTo>
+                    <a:pt x="28" y="414"/>
+                    <a:pt x="123" y="487"/>
+                    <a:pt x="221" y="487"/>
+                  </a:cubicBezTo>
+                  <a:cubicBezTo>
+                    <a:pt x="239" y="487"/>
+                    <a:pt x="258" y="484"/>
+                    <a:pt x="276" y="479"/>
+                  </a:cubicBezTo>
+                  <a:cubicBezTo>
+                    <a:pt x="442" y="433"/>
+                    <a:pt x="551" y="118"/>
+                    <a:pt x="359" y="0"/>
+                  </a:cubicBezTo>
+                  <a:close/>
+                </a:path>
+              </a:pathLst>
+            </a:custGeom>
+            <a:solidFill>
+              <a:schemeClr val="accent4"/>
+            </a:solidFill>
+            <a:ln>
+              <a:noFill/>
+            </a:ln>
+          </p:spPr>
+          <p:txBody>
+            <a:bodyPr spcFirstLastPara="1" wrap="square" lIns="91425" tIns="91425" rIns="91425" bIns="91425" anchor="ctr" anchorCtr="0">
+              <a:noAutofit/>
+            </a:bodyPr>
+            <a:lstStyle/>
+            <a:p>
+              <a:pPr marL="0" lvl="0" indent="0" algn="l" rtl="0">
+                <a:spcBef>
+                  <a:spcPts val="0"/>
+                </a:spcBef>
+                <a:spcAft>
+                  <a:spcPts val="0"/>
+                </a:spcAft>
+                <a:buNone/>
+              </a:pPr>
+              <a:endParaRPr/>
+            </a:p>
+          </p:txBody>
+        </p:sp>
+      </p:grpSp>
+      <p:sp>
+        <p:nvSpPr>
+          <p:cNvPr id="7" name="Google Shape;1343;p38">
+            <a:extLst>
+              <a:ext uri="{FF2B5EF4-FFF2-40B4-BE49-F238E27FC236}">
+                <a16:creationId xmlns:a16="http://schemas.microsoft.com/office/drawing/2014/main" id="{F15CCC14-A652-DCAE-F707-EFA7C83CA764}"/>
+              </a:ext>
+            </a:extLst>
+          </p:cNvPr>
+          <p:cNvSpPr txBox="1">
+            <a:spLocks/>
+          </p:cNvSpPr>
+          <p:nvPr/>
+        </p:nvSpPr>
+        <p:spPr>
+          <a:xfrm>
+            <a:off x="685392" y="544550"/>
+            <a:ext cx="7717800" cy="572700"/>
+          </a:xfrm>
+          <a:prstGeom prst="rect">
+            <a:avLst/>
+          </a:prstGeom>
+          <a:noFill/>
+          <a:ln>
+            <a:noFill/>
+          </a:ln>
+        </p:spPr>
+        <p:txBody>
+          <a:bodyPr spcFirstLastPara="1" wrap="square" lIns="91425" tIns="91425" rIns="91425" bIns="91425" anchor="ctr" anchorCtr="0">
+            <a:noAutofit/>
+          </a:bodyPr>
+          <a:lstStyle>
+            <a:defPPr marR="0" lvl="0" algn="l" rtl="0">
+              <a:lnSpc>
+                <a:spcPct val="100000"/>
+              </a:lnSpc>
+              <a:spcBef>
+                <a:spcPts val="0"/>
+              </a:spcBef>
+              <a:spcAft>
+                <a:spcPts val="0"/>
+              </a:spcAft>
+            </a:defPPr>
+            <a:lvl1pPr marR="0" lvl="0" algn="l" rtl="0">
+              <a:lnSpc>
+                <a:spcPct val="100000"/>
+              </a:lnSpc>
+              <a:spcBef>
+                <a:spcPts val="0"/>
+              </a:spcBef>
+              <a:spcAft>
+                <a:spcPts val="0"/>
+              </a:spcAft>
+              <a:buClr>
+                <a:schemeClr val="dk1"/>
+              </a:buClr>
+              <a:buSzPts val="3200"/>
+              <a:buFont typeface="Tajawal"/>
+              <a:buNone/>
+              <a:defRPr sz="3200" b="1" i="0" u="none" strike="noStrike" cap="none">
+                <a:solidFill>
+                  <a:schemeClr val="dk1"/>
+                </a:solidFill>
+                <a:latin typeface="Tajawal"/>
+                <a:ea typeface="Tajawal"/>
+                <a:cs typeface="Tajawal"/>
+                <a:sym typeface="Tajawal"/>
+              </a:defRPr>
+            </a:lvl1pPr>
+            <a:lvl2pPr marR="0" lvl="1" algn="l" rtl="0">
+              <a:lnSpc>
+                <a:spcPct val="100000"/>
+              </a:lnSpc>
+              <a:spcBef>
+                <a:spcPts val="0"/>
+              </a:spcBef>
+              <a:spcAft>
+                <a:spcPts val="0"/>
+              </a:spcAft>
+              <a:buClr>
+                <a:schemeClr val="dk1"/>
+              </a:buClr>
+              <a:buSzPts val="3200"/>
+              <a:buFont typeface="Tajawal"/>
+              <a:buNone/>
+              <a:defRPr sz="3200" b="1" i="0" u="none" strike="noStrike" cap="none">
+                <a:solidFill>
+                  <a:schemeClr val="dk1"/>
+                </a:solidFill>
+                <a:latin typeface="Tajawal"/>
+                <a:ea typeface="Tajawal"/>
+                <a:cs typeface="Tajawal"/>
+                <a:sym typeface="Tajawal"/>
+              </a:defRPr>
+            </a:lvl2pPr>
+            <a:lvl3pPr marR="0" lvl="2" algn="l" rtl="0">
+              <a:lnSpc>
+                <a:spcPct val="100000"/>
+              </a:lnSpc>
+              <a:spcBef>
+                <a:spcPts val="0"/>
+              </a:spcBef>
+              <a:spcAft>
+                <a:spcPts val="0"/>
+              </a:spcAft>
+              <a:buClr>
+                <a:schemeClr val="dk1"/>
+              </a:buClr>
+              <a:buSzPts val="3200"/>
+              <a:buFont typeface="Tajawal"/>
+              <a:buNone/>
+              <a:defRPr sz="3200" b="1" i="0" u="none" strike="noStrike" cap="none">
+                <a:solidFill>
+                  <a:schemeClr val="dk1"/>
+                </a:solidFill>
+                <a:latin typeface="Tajawal"/>
+                <a:ea typeface="Tajawal"/>
+                <a:cs typeface="Tajawal"/>
+                <a:sym typeface="Tajawal"/>
+              </a:defRPr>
+            </a:lvl3pPr>
+            <a:lvl4pPr marR="0" lvl="3" algn="l" rtl="0">
+              <a:lnSpc>
+                <a:spcPct val="100000"/>
+              </a:lnSpc>
+              <a:spcBef>
+                <a:spcPts val="0"/>
+              </a:spcBef>
+              <a:spcAft>
+                <a:spcPts val="0"/>
+              </a:spcAft>
+              <a:buClr>
+                <a:schemeClr val="dk1"/>
+              </a:buClr>
+              <a:buSzPts val="3200"/>
+              <a:buFont typeface="Tajawal"/>
+              <a:buNone/>
+              <a:defRPr sz="3200" b="1" i="0" u="none" strike="noStrike" cap="none">
+                <a:solidFill>
+                  <a:schemeClr val="dk1"/>
+                </a:solidFill>
+                <a:latin typeface="Tajawal"/>
+                <a:ea typeface="Tajawal"/>
+                <a:cs typeface="Tajawal"/>
+                <a:sym typeface="Tajawal"/>
+              </a:defRPr>
+            </a:lvl4pPr>
+            <a:lvl5pPr marR="0" lvl="4" algn="l" rtl="0">
+              <a:lnSpc>
+                <a:spcPct val="100000"/>
+              </a:lnSpc>
+              <a:spcBef>
+                <a:spcPts val="0"/>
+              </a:spcBef>
+              <a:spcAft>
+                <a:spcPts val="0"/>
+              </a:spcAft>
+              <a:buClr>
+                <a:schemeClr val="dk1"/>
+              </a:buClr>
+              <a:buSzPts val="3200"/>
+              <a:buFont typeface="Tajawal"/>
+              <a:buNone/>
+              <a:defRPr sz="3200" b="1" i="0" u="none" strike="noStrike" cap="none">
+                <a:solidFill>
+                  <a:schemeClr val="dk1"/>
+                </a:solidFill>
+                <a:latin typeface="Tajawal"/>
+                <a:ea typeface="Tajawal"/>
+                <a:cs typeface="Tajawal"/>
+                <a:sym typeface="Tajawal"/>
+              </a:defRPr>
+            </a:lvl5pPr>
+            <a:lvl6pPr marR="0" lvl="5" algn="l" rtl="0">
+              <a:lnSpc>
+                <a:spcPct val="100000"/>
+              </a:lnSpc>
+              <a:spcBef>
+                <a:spcPts val="0"/>
+              </a:spcBef>
+              <a:spcAft>
+                <a:spcPts val="0"/>
+              </a:spcAft>
+              <a:buClr>
+                <a:schemeClr val="dk1"/>
+              </a:buClr>
+              <a:buSzPts val="3200"/>
+              <a:buFont typeface="Tajawal"/>
+              <a:buNone/>
+              <a:defRPr sz="3200" b="1" i="0" u="none" strike="noStrike" cap="none">
+                <a:solidFill>
+                  <a:schemeClr val="dk1"/>
+                </a:solidFill>
+                <a:latin typeface="Tajawal"/>
+                <a:ea typeface="Tajawal"/>
+                <a:cs typeface="Tajawal"/>
+                <a:sym typeface="Tajawal"/>
+              </a:defRPr>
+            </a:lvl6pPr>
+            <a:lvl7pPr marR="0" lvl="6" algn="l" rtl="0">
+              <a:lnSpc>
+                <a:spcPct val="100000"/>
+              </a:lnSpc>
+              <a:spcBef>
+                <a:spcPts val="0"/>
+              </a:spcBef>
+              <a:spcAft>
+                <a:spcPts val="0"/>
+              </a:spcAft>
+              <a:buClr>
+                <a:schemeClr val="dk1"/>
+              </a:buClr>
+              <a:buSzPts val="3200"/>
+              <a:buFont typeface="Tajawal"/>
+              <a:buNone/>
+              <a:defRPr sz="3200" b="1" i="0" u="none" strike="noStrike" cap="none">
+                <a:solidFill>
+                  <a:schemeClr val="dk1"/>
+                </a:solidFill>
+                <a:latin typeface="Tajawal"/>
+                <a:ea typeface="Tajawal"/>
+                <a:cs typeface="Tajawal"/>
+                <a:sym typeface="Tajawal"/>
+              </a:defRPr>
+            </a:lvl7pPr>
+            <a:lvl8pPr marR="0" lvl="7" algn="l" rtl="0">
+              <a:lnSpc>
+                <a:spcPct val="100000"/>
+              </a:lnSpc>
+              <a:spcBef>
+                <a:spcPts val="0"/>
+              </a:spcBef>
+              <a:spcAft>
+                <a:spcPts val="0"/>
+              </a:spcAft>
+              <a:buClr>
+                <a:schemeClr val="dk1"/>
+              </a:buClr>
+              <a:buSzPts val="3200"/>
+              <a:buFont typeface="Tajawal"/>
+              <a:buNone/>
+              <a:defRPr sz="3200" b="1" i="0" u="none" strike="noStrike" cap="none">
+                <a:solidFill>
+                  <a:schemeClr val="dk1"/>
+                </a:solidFill>
+                <a:latin typeface="Tajawal"/>
+                <a:ea typeface="Tajawal"/>
+                <a:cs typeface="Tajawal"/>
+                <a:sym typeface="Tajawal"/>
+              </a:defRPr>
+            </a:lvl8pPr>
+            <a:lvl9pPr marR="0" lvl="8" algn="l" rtl="0">
+              <a:lnSpc>
+                <a:spcPct val="100000"/>
+              </a:lnSpc>
+              <a:spcBef>
+                <a:spcPts val="0"/>
+              </a:spcBef>
+              <a:spcAft>
+                <a:spcPts val="0"/>
+              </a:spcAft>
+              <a:buClr>
+                <a:schemeClr val="dk1"/>
+              </a:buClr>
+              <a:buSzPts val="3200"/>
+              <a:buFont typeface="Tajawal"/>
+              <a:buNone/>
+              <a:defRPr sz="3200" b="1" i="0" u="none" strike="noStrike" cap="none">
+                <a:solidFill>
+                  <a:schemeClr val="dk1"/>
+                </a:solidFill>
+                <a:latin typeface="Tajawal"/>
+                <a:ea typeface="Tajawal"/>
+                <a:cs typeface="Tajawal"/>
+                <a:sym typeface="Tajawal"/>
+              </a:defRPr>
+            </a:lvl9pPr>
+          </a:lstStyle>
+          <a:p>
+            <a:r>
+              <a:rPr lang="en-GB"/>
+              <a:t>Decision Tree</a:t>
+            </a:r>
+            <a:endParaRPr lang="en-GB" dirty="0"/>
+          </a:p>
+        </p:txBody>
+      </p:sp>
+      <p:pic>
+        <p:nvPicPr>
+          <p:cNvPr id="6" name="Picture 5" descr="A picture containing circle&#10;&#10;Description automatically generated">
+            <a:extLst>
+              <a:ext uri="{FF2B5EF4-FFF2-40B4-BE49-F238E27FC236}">
+                <a16:creationId xmlns:a16="http://schemas.microsoft.com/office/drawing/2014/main" id="{BCC1A354-C16D-AB32-B9A9-8A5FA86E74F5}"/>
+              </a:ext>
+            </a:extLst>
+          </p:cNvPr>
+          <p:cNvPicPr>
+            <a:picLocks noChangeAspect="1"/>
+          </p:cNvPicPr>
+          <p:nvPr/>
+        </p:nvPicPr>
+        <p:blipFill>
+          <a:blip r:embed="rId4"/>
+          <a:stretch>
+            <a:fillRect/>
+          </a:stretch>
+        </p:blipFill>
+        <p:spPr>
+          <a:xfrm>
+            <a:off x="7820528" y="132735"/>
+            <a:ext cx="1258284" cy="677376"/>
+          </a:xfrm>
+          <a:prstGeom prst="rect">
+            <a:avLst/>
+          </a:prstGeom>
+        </p:spPr>
+      </p:pic>
+      <p:sp>
+        <p:nvSpPr>
+          <p:cNvPr id="8" name="Title 1">
+            <a:extLst>
+              <a:ext uri="{FF2B5EF4-FFF2-40B4-BE49-F238E27FC236}">
+                <a16:creationId xmlns:a16="http://schemas.microsoft.com/office/drawing/2014/main" id="{FAEE2A23-1D56-E547-5EF2-FA582DC6F459}"/>
+              </a:ext>
+            </a:extLst>
+          </p:cNvPr>
+          <p:cNvSpPr txBox="1">
+            <a:spLocks/>
+          </p:cNvSpPr>
+          <p:nvPr/>
+        </p:nvSpPr>
+        <p:spPr>
+          <a:xfrm>
+            <a:off x="731870" y="280427"/>
+            <a:ext cx="7717800" cy="572700"/>
+          </a:xfrm>
+          <a:prstGeom prst="rect">
+            <a:avLst/>
+          </a:prstGeom>
+          <a:noFill/>
+          <a:ln>
+            <a:noFill/>
+          </a:ln>
+        </p:spPr>
+        <p:txBody>
+          <a:bodyPr spcFirstLastPara="1" wrap="square" lIns="91425" tIns="91425" rIns="91425" bIns="91425" anchor="ctr" anchorCtr="0">
+            <a:noAutofit/>
+          </a:bodyPr>
+          <a:lstStyle>
+            <a:defPPr marR="0" lvl="0" algn="l" rtl="0">
+              <a:lnSpc>
+                <a:spcPct val="100000"/>
+              </a:lnSpc>
+              <a:spcBef>
+                <a:spcPts val="0"/>
+              </a:spcBef>
+              <a:spcAft>
+                <a:spcPts val="0"/>
+              </a:spcAft>
+            </a:defPPr>
+            <a:lvl1pPr marR="0" lvl="0" algn="l" rtl="0">
+              <a:lnSpc>
+                <a:spcPct val="100000"/>
+              </a:lnSpc>
+              <a:spcBef>
+                <a:spcPts val="0"/>
+              </a:spcBef>
+              <a:spcAft>
+                <a:spcPts val="0"/>
+              </a:spcAft>
+              <a:buClr>
+                <a:schemeClr val="dk1"/>
+              </a:buClr>
+              <a:buSzPts val="3200"/>
+              <a:buFont typeface="Tajawal"/>
+              <a:buNone/>
+              <a:defRPr sz="3200" b="1" i="0" u="none" strike="noStrike" cap="none">
+                <a:solidFill>
+                  <a:schemeClr val="dk1"/>
+                </a:solidFill>
+                <a:latin typeface="Tajawal"/>
+                <a:ea typeface="Tajawal"/>
+                <a:cs typeface="Tajawal"/>
+                <a:sym typeface="Tajawal"/>
+              </a:defRPr>
+            </a:lvl1pPr>
+            <a:lvl2pPr marR="0" lvl="1" algn="l" rtl="0">
+              <a:lnSpc>
+                <a:spcPct val="100000"/>
+              </a:lnSpc>
+              <a:spcBef>
+                <a:spcPts val="0"/>
+              </a:spcBef>
+              <a:spcAft>
+                <a:spcPts val="0"/>
+              </a:spcAft>
+              <a:buClr>
+                <a:schemeClr val="dk1"/>
+              </a:buClr>
+              <a:buSzPts val="3200"/>
+              <a:buFont typeface="Tajawal"/>
+              <a:buNone/>
+              <a:defRPr sz="3200" b="1" i="0" u="none" strike="noStrike" cap="none">
+                <a:solidFill>
+                  <a:schemeClr val="dk1"/>
+                </a:solidFill>
+                <a:latin typeface="Tajawal"/>
+                <a:ea typeface="Tajawal"/>
+                <a:cs typeface="Tajawal"/>
+                <a:sym typeface="Tajawal"/>
+              </a:defRPr>
+            </a:lvl2pPr>
+            <a:lvl3pPr marR="0" lvl="2" algn="l" rtl="0">
+              <a:lnSpc>
+                <a:spcPct val="100000"/>
+              </a:lnSpc>
+              <a:spcBef>
+                <a:spcPts val="0"/>
+              </a:spcBef>
+              <a:spcAft>
+                <a:spcPts val="0"/>
+              </a:spcAft>
+              <a:buClr>
+                <a:schemeClr val="dk1"/>
+              </a:buClr>
+              <a:buSzPts val="3200"/>
+              <a:buFont typeface="Tajawal"/>
+              <a:buNone/>
+              <a:defRPr sz="3200" b="1" i="0" u="none" strike="noStrike" cap="none">
+                <a:solidFill>
+                  <a:schemeClr val="dk1"/>
+                </a:solidFill>
+                <a:latin typeface="Tajawal"/>
+                <a:ea typeface="Tajawal"/>
+                <a:cs typeface="Tajawal"/>
+                <a:sym typeface="Tajawal"/>
+              </a:defRPr>
+            </a:lvl3pPr>
+            <a:lvl4pPr marR="0" lvl="3" algn="l" rtl="0">
+              <a:lnSpc>
+                <a:spcPct val="100000"/>
+              </a:lnSpc>
+              <a:spcBef>
+                <a:spcPts val="0"/>
+              </a:spcBef>
+              <a:spcAft>
+                <a:spcPts val="0"/>
+              </a:spcAft>
+              <a:buClr>
+                <a:schemeClr val="dk1"/>
+              </a:buClr>
+              <a:buSzPts val="3200"/>
+              <a:buFont typeface="Tajawal"/>
+              <a:buNone/>
+              <a:defRPr sz="3200" b="1" i="0" u="none" strike="noStrike" cap="none">
+                <a:solidFill>
+                  <a:schemeClr val="dk1"/>
+                </a:solidFill>
+                <a:latin typeface="Tajawal"/>
+                <a:ea typeface="Tajawal"/>
+                <a:cs typeface="Tajawal"/>
+                <a:sym typeface="Tajawal"/>
+              </a:defRPr>
+            </a:lvl4pPr>
+            <a:lvl5pPr marR="0" lvl="4" algn="l" rtl="0">
+              <a:lnSpc>
+                <a:spcPct val="100000"/>
+              </a:lnSpc>
+              <a:spcBef>
+                <a:spcPts val="0"/>
+              </a:spcBef>
+              <a:spcAft>
+                <a:spcPts val="0"/>
+              </a:spcAft>
+              <a:buClr>
+                <a:schemeClr val="dk1"/>
+              </a:buClr>
+              <a:buSzPts val="3200"/>
+              <a:buFont typeface="Tajawal"/>
+              <a:buNone/>
+              <a:defRPr sz="3200" b="1" i="0" u="none" strike="noStrike" cap="none">
+                <a:solidFill>
+                  <a:schemeClr val="dk1"/>
+                </a:solidFill>
+                <a:latin typeface="Tajawal"/>
+                <a:ea typeface="Tajawal"/>
+                <a:cs typeface="Tajawal"/>
+                <a:sym typeface="Tajawal"/>
+              </a:defRPr>
+            </a:lvl5pPr>
+            <a:lvl6pPr marR="0" lvl="5" algn="l" rtl="0">
+              <a:lnSpc>
+                <a:spcPct val="100000"/>
+              </a:lnSpc>
+              <a:spcBef>
+                <a:spcPts val="0"/>
+              </a:spcBef>
+              <a:spcAft>
+                <a:spcPts val="0"/>
+              </a:spcAft>
+              <a:buClr>
+                <a:schemeClr val="dk1"/>
+              </a:buClr>
+              <a:buSzPts val="3200"/>
+              <a:buFont typeface="Tajawal"/>
+              <a:buNone/>
+              <a:defRPr sz="3200" b="1" i="0" u="none" strike="noStrike" cap="none">
+                <a:solidFill>
+                  <a:schemeClr val="dk1"/>
+                </a:solidFill>
+                <a:latin typeface="Tajawal"/>
+                <a:ea typeface="Tajawal"/>
+                <a:cs typeface="Tajawal"/>
+                <a:sym typeface="Tajawal"/>
+              </a:defRPr>
+            </a:lvl6pPr>
+            <a:lvl7pPr marR="0" lvl="6" algn="l" rtl="0">
+              <a:lnSpc>
+                <a:spcPct val="100000"/>
+              </a:lnSpc>
+              <a:spcBef>
+                <a:spcPts val="0"/>
+              </a:spcBef>
+              <a:spcAft>
+                <a:spcPts val="0"/>
+              </a:spcAft>
+              <a:buClr>
+                <a:schemeClr val="dk1"/>
+              </a:buClr>
+              <a:buSzPts val="3200"/>
+              <a:buFont typeface="Tajawal"/>
+              <a:buNone/>
+              <a:defRPr sz="3200" b="1" i="0" u="none" strike="noStrike" cap="none">
+                <a:solidFill>
+                  <a:schemeClr val="dk1"/>
+                </a:solidFill>
+                <a:latin typeface="Tajawal"/>
+                <a:ea typeface="Tajawal"/>
+                <a:cs typeface="Tajawal"/>
+                <a:sym typeface="Tajawal"/>
+              </a:defRPr>
+            </a:lvl7pPr>
+            <a:lvl8pPr marR="0" lvl="7" algn="l" rtl="0">
+              <a:lnSpc>
+                <a:spcPct val="100000"/>
+              </a:lnSpc>
+              <a:spcBef>
+                <a:spcPts val="0"/>
+              </a:spcBef>
+              <a:spcAft>
+                <a:spcPts val="0"/>
+              </a:spcAft>
+              <a:buClr>
+                <a:schemeClr val="dk1"/>
+              </a:buClr>
+              <a:buSzPts val="3200"/>
+              <a:buFont typeface="Tajawal"/>
+              <a:buNone/>
+              <a:defRPr sz="3200" b="1" i="0" u="none" strike="noStrike" cap="none">
+                <a:solidFill>
+                  <a:schemeClr val="dk1"/>
+                </a:solidFill>
+                <a:latin typeface="Tajawal"/>
+                <a:ea typeface="Tajawal"/>
+                <a:cs typeface="Tajawal"/>
+                <a:sym typeface="Tajawal"/>
+              </a:defRPr>
+            </a:lvl8pPr>
+            <a:lvl9pPr marR="0" lvl="8" algn="l" rtl="0">
+              <a:lnSpc>
+                <a:spcPct val="100000"/>
+              </a:lnSpc>
+              <a:spcBef>
+                <a:spcPts val="0"/>
+              </a:spcBef>
+              <a:spcAft>
+                <a:spcPts val="0"/>
+              </a:spcAft>
+              <a:buClr>
+                <a:schemeClr val="dk1"/>
+              </a:buClr>
+              <a:buSzPts val="3200"/>
+              <a:buFont typeface="Tajawal"/>
+              <a:buNone/>
+              <a:defRPr sz="3200" b="1" i="0" u="none" strike="noStrike" cap="none">
+                <a:solidFill>
+                  <a:schemeClr val="dk1"/>
+                </a:solidFill>
+                <a:latin typeface="Tajawal"/>
+                <a:ea typeface="Tajawal"/>
+                <a:cs typeface="Tajawal"/>
+                <a:sym typeface="Tajawal"/>
+              </a:defRPr>
+            </a:lvl9pPr>
+          </a:lstStyle>
+          <a:p>
+            <a:r>
+              <a:rPr lang="it-IT" sz="1200" i="1" dirty="0">
+                <a:solidFill>
+                  <a:srgbClr val="00B050"/>
+                </a:solidFill>
+              </a:rPr>
+              <a:t>TEXT CLASSIFICATION – PRE-PROCESSING</a:t>
+            </a:r>
+            <a:endParaRPr lang="it-IT" i="1" dirty="0">
+              <a:solidFill>
+                <a:srgbClr val="00B050"/>
+              </a:solidFill>
+            </a:endParaRPr>
+          </a:p>
+        </p:txBody>
+      </p:sp>
+    </p:spTree>
+    <p:extLst>
+      <p:ext uri="{BB962C8B-B14F-4D97-AF65-F5344CB8AC3E}">
+        <p14:creationId xmlns:p14="http://schemas.microsoft.com/office/powerpoint/2010/main" val="3456230359"/>
       </p:ext>
     </p:extLst>
   </p:cSld>

</xml_diff>